<commit_message>
new files for the steering committee
git-svn-id: svn://localhost/ARK/trunk@8250 35ee9b83-dd2c-47f4-99a2-c706670c48ce
</commit_message>
<xml_diff>
--- a/usefulTools/TestFilesAndDocuments/steering committee/NeCTAR/Steering Committee Meetings/Steering Committee Meeting June_2013.pptx
+++ b/usefulTools/TestFilesAndDocuments/steering committee/NeCTAR/Steering Committee Meetings/Steering Committee Meeting June_2013.pptx
@@ -5362,7 +5362,7 @@
         </p:spPr>
         <p:txBody>
           <a:bodyPr>
-            <a:normAutofit lnSpcReduction="10000"/>
+            <a:normAutofit/>
           </a:bodyPr>
           <a:lstStyle/>
           <a:p>
@@ -5533,24 +5533,9 @@
               <a:rPr lang="en-AU" sz="1500" dirty="0" smtClean="0"/>
               <a:t>20% complete</a:t>
             </a:r>
-            <a:endParaRPr lang="en-AU" sz="1500" dirty="0" smtClean="0"/>
           </a:p>
           <a:p>
             <a:pPr lvl="3"/>
-            <a:r>
-              <a:rPr lang="en-US" sz="1600" dirty="0" smtClean="0"/>
-              <a:t>Have planned out and briefly started on a solution which avoids GVL</a:t>
-            </a:r>
-          </a:p>
-          <a:p>
-            <a:pPr lvl="3"/>
-            <a:r>
-              <a:rPr lang="en-US" sz="1600" dirty="0" smtClean="0"/>
-              <a:t>Will revisit GVL to see if suitability exists right now.</a:t>
-            </a:r>
-            <a:endParaRPr lang="en-US" sz="1600" dirty="0" smtClean="0"/>
-          </a:p>
-          <a:p>
             <a:endParaRPr lang="en-US" sz="2400" dirty="0" smtClean="0"/>
           </a:p>
           <a:p>
@@ -5794,7 +5779,7 @@
       </p:sp>
       <p:pic>
         <p:nvPicPr>
-          <p:cNvPr id="4" name="Content Placeholder 3" descr="Screen shot 2013-03-26 at 4.16.22 AM.png"/>
+          <p:cNvPr id="9" name="Content Placeholder 8" descr="Screen shot 2013-07-12 at 5.27.59 AM.png"/>
           <p:cNvPicPr>
             <a:picLocks noGrp="1" noChangeAspect="1"/>
           </p:cNvPicPr>
@@ -5810,13 +5795,13 @@
               </a:ext>
             </a:extLst>
           </a:blip>
-          <a:srcRect l="1104" t="-4583"/>
+          <a:srcRect l="4486" r="8662"/>
           <a:stretch/>
         </p:blipFill>
         <p:spPr>
           <a:xfrm>
-            <a:off x="101019" y="1219200"/>
-            <a:ext cx="9042981" cy="5100309"/>
+            <a:off x="-1364074" y="1600200"/>
+            <a:ext cx="11551426" cy="4495800"/>
           </a:xfrm>
         </p:spPr>
       </p:pic>
@@ -5886,43 +5871,1203 @@
           </a:p>
         </p:txBody>
       </p:sp>
-      <p:pic>
-        <p:nvPicPr>
-          <p:cNvPr id="8193" name="Picture 1"/>
-          <p:cNvPicPr>
-            <a:picLocks noChangeAspect="1" noChangeArrowheads="1"/>
-          </p:cNvPicPr>
-          <p:nvPr/>
-        </p:nvPicPr>
-        <p:blipFill>
-          <a:blip r:embed="rId2">
-            <a:extLst>
-              <a:ext uri="{28A0092B-C50C-407E-A947-70E740481C1C}">
-                <a14:useLocalDpi xmlns:a14="http://schemas.microsoft.com/office/drawing/2010/main" val="0"/>
-              </a:ext>
-            </a:extLst>
-          </a:blip>
-          <a:stretch>
-            <a:fillRect/>
-          </a:stretch>
-        </p:blipFill>
-        <p:spPr bwMode="auto">
-          <a:xfrm>
-            <a:off x="337951" y="1572903"/>
-            <a:ext cx="8468098" cy="4177925"/>
-          </a:xfrm>
-          <a:prstGeom prst="rect">
-            <a:avLst/>
-          </a:prstGeom>
-          <a:noFill/>
-          <a:ln w="9525">
-            <a:noFill/>
-            <a:miter lim="800000"/>
-            <a:headEnd/>
-            <a:tailEnd/>
-          </a:ln>
-        </p:spPr>
-      </p:pic>
+      <p:graphicFrame>
+        <p:nvGraphicFramePr>
+          <p:cNvPr id="2" name="Table 1"/>
+          <p:cNvGraphicFramePr>
+            <a:graphicFrameLocks noGrp="1"/>
+          </p:cNvGraphicFramePr>
+          <p:nvPr>
+            <p:extLst>
+              <p:ext uri="{D42A27DB-BD31-4B8C-83A1-F6EECF244321}">
+                <p14:modId xmlns:p14="http://schemas.microsoft.com/office/powerpoint/2010/main" val="1662437775"/>
+              </p:ext>
+            </p:extLst>
+          </p:nvPr>
+        </p:nvGraphicFramePr>
+        <p:xfrm>
+          <a:off x="165648" y="1684018"/>
+          <a:ext cx="8760939" cy="4904817"/>
+        </p:xfrm>
+        <a:graphic>
+          <a:graphicData uri="http://schemas.openxmlformats.org/drawingml/2006/table">
+            <a:tbl>
+              <a:tblPr/>
+              <a:tblGrid>
+                <a:gridCol w="1025717"/>
+                <a:gridCol w="2973638"/>
+                <a:gridCol w="3557073"/>
+                <a:gridCol w="1204511"/>
+              </a:tblGrid>
+              <a:tr h="893398">
+                <a:tc>
+                  <a:txBody>
+                    <a:bodyPr/>
+                    <a:lstStyle/>
+                    <a:p>
+                      <a:pPr algn="l" fontAlgn="ctr"/>
+                      <a:r>
+                        <a:rPr lang="en-US" sz="700" b="0" i="0" u="none" strike="noStrike">
+                          <a:solidFill>
+                            <a:srgbClr val="000000"/>
+                          </a:solidFill>
+                          <a:effectLst/>
+                          <a:latin typeface="Calibri"/>
+                        </a:rPr>
+                        <a:t>Ark-628</a:t>
+                      </a:r>
+                    </a:p>
+                  </a:txBody>
+                  <a:tcPr marL="0" marR="0" marT="0" marB="0" anchor="ctr">
+                    <a:lnL w="12700" cap="flat" cmpd="sng" algn="ctr">
+                      <a:solidFill>
+                        <a:srgbClr val="000000"/>
+                      </a:solidFill>
+                      <a:prstDash val="solid"/>
+                      <a:round/>
+                      <a:headEnd type="none" w="med" len="med"/>
+                      <a:tailEnd type="none" w="med" len="med"/>
+                    </a:lnL>
+                    <a:lnR w="6350" cap="flat" cmpd="sng" algn="ctr">
+                      <a:solidFill>
+                        <a:srgbClr val="000000"/>
+                      </a:solidFill>
+                      <a:prstDash val="solid"/>
+                      <a:round/>
+                      <a:headEnd type="none" w="med" len="med"/>
+                      <a:tailEnd type="none" w="med" len="med"/>
+                    </a:lnR>
+                    <a:lnT w="6350" cap="flat" cmpd="sng" algn="ctr">
+                      <a:solidFill>
+                        <a:srgbClr val="000000"/>
+                      </a:solidFill>
+                      <a:prstDash val="solid"/>
+                      <a:round/>
+                      <a:headEnd type="none" w="med" len="med"/>
+                      <a:tailEnd type="none" w="med" len="med"/>
+                    </a:lnT>
+                    <a:lnB w="6350" cap="flat" cmpd="sng" algn="ctr">
+                      <a:solidFill>
+                        <a:srgbClr val="000000"/>
+                      </a:solidFill>
+                      <a:prstDash val="solid"/>
+                      <a:round/>
+                      <a:headEnd type="none" w="med" len="med"/>
+                      <a:tailEnd type="none" w="med" len="med"/>
+                    </a:lnB>
+                  </a:tcPr>
+                </a:tc>
+                <a:tc>
+                  <a:txBody>
+                    <a:bodyPr/>
+                    <a:lstStyle/>
+                    <a:p>
+                      <a:pPr algn="l" fontAlgn="ctr"/>
+                      <a:r>
+                        <a:rPr lang="en-US" sz="700" b="0" i="0" u="none" strike="noStrike">
+                          <a:solidFill>
+                            <a:srgbClr val="000000"/>
+                          </a:solidFill>
+                          <a:effectLst/>
+                          <a:latin typeface="Calibri"/>
+                        </a:rPr>
+                        <a:t>The impact of the reduced $ and delay of the GVL project on genomics storage is unknown</a:t>
+                      </a:r>
+                    </a:p>
+                  </a:txBody>
+                  <a:tcPr marL="0" marR="0" marT="0" marB="0" anchor="ctr">
+                    <a:lnL w="6350" cap="flat" cmpd="sng" algn="ctr">
+                      <a:solidFill>
+                        <a:srgbClr val="000000"/>
+                      </a:solidFill>
+                      <a:prstDash val="solid"/>
+                      <a:round/>
+                      <a:headEnd type="none" w="med" len="med"/>
+                      <a:tailEnd type="none" w="med" len="med"/>
+                    </a:lnL>
+                    <a:lnR w="6350" cap="flat" cmpd="sng" algn="ctr">
+                      <a:solidFill>
+                        <a:srgbClr val="000000"/>
+                      </a:solidFill>
+                      <a:prstDash val="solid"/>
+                      <a:round/>
+                      <a:headEnd type="none" w="med" len="med"/>
+                      <a:tailEnd type="none" w="med" len="med"/>
+                    </a:lnR>
+                    <a:lnT w="6350" cap="flat" cmpd="sng" algn="ctr">
+                      <a:solidFill>
+                        <a:srgbClr val="000000"/>
+                      </a:solidFill>
+                      <a:prstDash val="solid"/>
+                      <a:round/>
+                      <a:headEnd type="none" w="med" len="med"/>
+                      <a:tailEnd type="none" w="med" len="med"/>
+                    </a:lnT>
+                    <a:lnB w="6350" cap="flat" cmpd="sng" algn="ctr">
+                      <a:solidFill>
+                        <a:srgbClr val="000000"/>
+                      </a:solidFill>
+                      <a:prstDash val="solid"/>
+                      <a:round/>
+                      <a:headEnd type="none" w="med" len="med"/>
+                      <a:tailEnd type="none" w="med" len="med"/>
+                    </a:lnB>
+                  </a:tcPr>
+                </a:tc>
+                <a:tc>
+                  <a:txBody>
+                    <a:bodyPr/>
+                    <a:lstStyle/>
+                    <a:p>
+                      <a:pPr algn="l" fontAlgn="ctr"/>
+                      <a:r>
+                        <a:rPr lang="en-US" sz="700" b="0" i="0" u="none" strike="noStrike">
+                          <a:solidFill>
+                            <a:srgbClr val="000000"/>
+                          </a:solidFill>
+                          <a:effectLst/>
+                          <a:latin typeface="Calibri"/>
+                        </a:rPr>
+                        <a:t> Genomic Data Repository (installed at UNSW) determined not to be suitable so will be developing a solution in-house.  GVL project continues to be delayed.   UWA staff developed a solution which bypassed GVL.  Travis will do some research to check that GVL may be back as an option, and if timeline permits we can head back in that direction.  The reduced dollars is obviously always a risk given that the original estimates are what they are and reducing dollars means reducing hours of developer time.</a:t>
+                      </a:r>
+                    </a:p>
+                  </a:txBody>
+                  <a:tcPr marL="0" marR="0" marT="0" marB="0" anchor="ctr">
+                    <a:lnL w="6350" cap="flat" cmpd="sng" algn="ctr">
+                      <a:solidFill>
+                        <a:srgbClr val="000000"/>
+                      </a:solidFill>
+                      <a:prstDash val="solid"/>
+                      <a:round/>
+                      <a:headEnd type="none" w="med" len="med"/>
+                      <a:tailEnd type="none" w="med" len="med"/>
+                    </a:lnL>
+                    <a:lnR w="6350" cap="flat" cmpd="sng" algn="ctr">
+                      <a:solidFill>
+                        <a:srgbClr val="000000"/>
+                      </a:solidFill>
+                      <a:prstDash val="solid"/>
+                      <a:round/>
+                      <a:headEnd type="none" w="med" len="med"/>
+                      <a:tailEnd type="none" w="med" len="med"/>
+                    </a:lnR>
+                    <a:lnT w="6350" cap="flat" cmpd="sng" algn="ctr">
+                      <a:solidFill>
+                        <a:srgbClr val="000000"/>
+                      </a:solidFill>
+                      <a:prstDash val="solid"/>
+                      <a:round/>
+                      <a:headEnd type="none" w="med" len="med"/>
+                      <a:tailEnd type="none" w="med" len="med"/>
+                    </a:lnT>
+                    <a:lnB w="6350" cap="flat" cmpd="sng" algn="ctr">
+                      <a:solidFill>
+                        <a:srgbClr val="000000"/>
+                      </a:solidFill>
+                      <a:prstDash val="solid"/>
+                      <a:round/>
+                      <a:headEnd type="none" w="med" len="med"/>
+                      <a:tailEnd type="none" w="med" len="med"/>
+                    </a:lnB>
+                  </a:tcPr>
+                </a:tc>
+                <a:tc>
+                  <a:txBody>
+                    <a:bodyPr/>
+                    <a:lstStyle/>
+                    <a:p>
+                      <a:pPr algn="ctr" fontAlgn="ctr"/>
+                      <a:r>
+                        <a:rPr lang="en-US" sz="700" b="0" i="0" u="none" strike="noStrike">
+                          <a:solidFill>
+                            <a:srgbClr val="9C6500"/>
+                          </a:solidFill>
+                          <a:effectLst/>
+                          <a:latin typeface="Calibri"/>
+                        </a:rPr>
+                        <a:t>Amber</a:t>
+                      </a:r>
+                    </a:p>
+                  </a:txBody>
+                  <a:tcPr marL="0" marR="0" marT="0" marB="0" anchor="ctr">
+                    <a:lnL w="6350" cap="flat" cmpd="sng" algn="ctr">
+                      <a:solidFill>
+                        <a:srgbClr val="000000"/>
+                      </a:solidFill>
+                      <a:prstDash val="solid"/>
+                      <a:round/>
+                      <a:headEnd type="none" w="med" len="med"/>
+                      <a:tailEnd type="none" w="med" len="med"/>
+                    </a:lnL>
+                    <a:lnR w="12700" cap="flat" cmpd="sng" algn="ctr">
+                      <a:solidFill>
+                        <a:srgbClr val="000000"/>
+                      </a:solidFill>
+                      <a:prstDash val="solid"/>
+                      <a:round/>
+                      <a:headEnd type="none" w="med" len="med"/>
+                      <a:tailEnd type="none" w="med" len="med"/>
+                    </a:lnR>
+                    <a:lnT w="6350" cap="flat" cmpd="sng" algn="ctr">
+                      <a:solidFill>
+                        <a:srgbClr val="000000"/>
+                      </a:solidFill>
+                      <a:prstDash val="solid"/>
+                      <a:round/>
+                      <a:headEnd type="none" w="med" len="med"/>
+                      <a:tailEnd type="none" w="med" len="med"/>
+                    </a:lnT>
+                    <a:lnB w="6350" cap="flat" cmpd="sng" algn="ctr">
+                      <a:solidFill>
+                        <a:srgbClr val="000000"/>
+                      </a:solidFill>
+                      <a:prstDash val="solid"/>
+                      <a:round/>
+                      <a:headEnd type="none" w="med" len="med"/>
+                      <a:tailEnd type="none" w="med" len="med"/>
+                    </a:lnB>
+                    <a:solidFill>
+                      <a:srgbClr val="FFEB9C"/>
+                    </a:solidFill>
+                  </a:tcPr>
+                </a:tc>
+              </a:tr>
+              <a:tr h="1331225">
+                <a:tc>
+                  <a:txBody>
+                    <a:bodyPr/>
+                    <a:lstStyle/>
+                    <a:p>
+                      <a:pPr algn="l" fontAlgn="ctr"/>
+                      <a:r>
+                        <a:rPr lang="en-US" sz="700" b="0" i="0" u="none" strike="noStrike">
+                          <a:solidFill>
+                            <a:srgbClr val="000000"/>
+                          </a:solidFill>
+                          <a:effectLst/>
+                          <a:latin typeface="Calibri"/>
+                        </a:rPr>
+                        <a:t>1</a:t>
+                      </a:r>
+                    </a:p>
+                  </a:txBody>
+                  <a:tcPr marL="0" marR="0" marT="0" marB="0" anchor="ctr">
+                    <a:lnL w="12700" cap="flat" cmpd="sng" algn="ctr">
+                      <a:solidFill>
+                        <a:srgbClr val="000000"/>
+                      </a:solidFill>
+                      <a:prstDash val="solid"/>
+                      <a:round/>
+                      <a:headEnd type="none" w="med" len="med"/>
+                      <a:tailEnd type="none" w="med" len="med"/>
+                    </a:lnL>
+                    <a:lnR w="6350" cap="flat" cmpd="sng" algn="ctr">
+                      <a:solidFill>
+                        <a:srgbClr val="000000"/>
+                      </a:solidFill>
+                      <a:prstDash val="solid"/>
+                      <a:round/>
+                      <a:headEnd type="none" w="med" len="med"/>
+                      <a:tailEnd type="none" w="med" len="med"/>
+                    </a:lnR>
+                    <a:lnT w="6350" cap="flat" cmpd="sng" algn="ctr">
+                      <a:solidFill>
+                        <a:srgbClr val="000000"/>
+                      </a:solidFill>
+                      <a:prstDash val="solid"/>
+                      <a:round/>
+                      <a:headEnd type="none" w="med" len="med"/>
+                      <a:tailEnd type="none" w="med" len="med"/>
+                    </a:lnT>
+                    <a:lnB w="6350" cap="flat" cmpd="sng" algn="ctr">
+                      <a:solidFill>
+                        <a:srgbClr val="000000"/>
+                      </a:solidFill>
+                      <a:prstDash val="solid"/>
+                      <a:round/>
+                      <a:headEnd type="none" w="med" len="med"/>
+                      <a:tailEnd type="none" w="med" len="med"/>
+                    </a:lnB>
+                  </a:tcPr>
+                </a:tc>
+                <a:tc>
+                  <a:txBody>
+                    <a:bodyPr/>
+                    <a:lstStyle/>
+                    <a:p>
+                      <a:pPr algn="l" fontAlgn="ctr"/>
+                      <a:r>
+                        <a:rPr lang="en-US" sz="700" b="0" i="0" u="none" strike="noStrike">
+                          <a:solidFill>
+                            <a:srgbClr val="000000"/>
+                          </a:solidFill>
+                          <a:effectLst/>
+                          <a:latin typeface="Calibri"/>
+                        </a:rPr>
+                        <a:t>Availability of appropriately skilled development resources. </a:t>
+                      </a:r>
+                    </a:p>
+                  </a:txBody>
+                  <a:tcPr marL="0" marR="0" marT="0" marB="0" anchor="ctr">
+                    <a:lnL w="6350" cap="flat" cmpd="sng" algn="ctr">
+                      <a:solidFill>
+                        <a:srgbClr val="000000"/>
+                      </a:solidFill>
+                      <a:prstDash val="solid"/>
+                      <a:round/>
+                      <a:headEnd type="none" w="med" len="med"/>
+                      <a:tailEnd type="none" w="med" len="med"/>
+                    </a:lnL>
+                    <a:lnR w="6350" cap="flat" cmpd="sng" algn="ctr">
+                      <a:solidFill>
+                        <a:srgbClr val="000000"/>
+                      </a:solidFill>
+                      <a:prstDash val="solid"/>
+                      <a:round/>
+                      <a:headEnd type="none" w="med" len="med"/>
+                      <a:tailEnd type="none" w="med" len="med"/>
+                    </a:lnR>
+                    <a:lnT w="6350" cap="flat" cmpd="sng" algn="ctr">
+                      <a:solidFill>
+                        <a:srgbClr val="000000"/>
+                      </a:solidFill>
+                      <a:prstDash val="solid"/>
+                      <a:round/>
+                      <a:headEnd type="none" w="med" len="med"/>
+                      <a:tailEnd type="none" w="med" len="med"/>
+                    </a:lnT>
+                    <a:lnB w="6350" cap="flat" cmpd="sng" algn="ctr">
+                      <a:solidFill>
+                        <a:srgbClr val="000000"/>
+                      </a:solidFill>
+                      <a:prstDash val="solid"/>
+                      <a:round/>
+                      <a:headEnd type="none" w="med" len="med"/>
+                      <a:tailEnd type="none" w="med" len="med"/>
+                    </a:lnB>
+                  </a:tcPr>
+                </a:tc>
+                <a:tc>
+                  <a:txBody>
+                    <a:bodyPr/>
+                    <a:lstStyle/>
+                    <a:p>
+                      <a:pPr algn="l" fontAlgn="ctr"/>
+                      <a:r>
+                        <a:rPr lang="en-US" sz="700" b="0" i="0" u="none" strike="noStrike">
+                          <a:solidFill>
+                            <a:srgbClr val="000000"/>
+                          </a:solidFill>
+                          <a:effectLst/>
+                          <a:latin typeface="Calibri"/>
+                        </a:rPr>
+                        <a:t>One developer has been ill and may need extended sick leave.  Have submitted an RFC to adjust milestone dates and have identified another part time develop to assist.  Developer did take leave, cannot be sure of the future availability of developer, but as of today he is back.  A tight timeline still exists, and part-time developer has not had the time available initially indicated to us. In the interim an increased output from some key members has allowed the project to make up for this shortfall as staff roll back into productivity.  A member of UWA team took on an extra day a week and has worked significantly over time to get back on (revised) schedule.  PhD student Thilina is also having to adjust his schedule to meet his writing and other needs, so his availability is a little less than originally thought but his productivity is still good at times he is available</a:t>
+                      </a:r>
+                    </a:p>
+                  </a:txBody>
+                  <a:tcPr marL="0" marR="0" marT="0" marB="0" anchor="ctr">
+                    <a:lnL w="6350" cap="flat" cmpd="sng" algn="ctr">
+                      <a:solidFill>
+                        <a:srgbClr val="000000"/>
+                      </a:solidFill>
+                      <a:prstDash val="solid"/>
+                      <a:round/>
+                      <a:headEnd type="none" w="med" len="med"/>
+                      <a:tailEnd type="none" w="med" len="med"/>
+                    </a:lnL>
+                    <a:lnR w="6350" cap="flat" cmpd="sng" algn="ctr">
+                      <a:solidFill>
+                        <a:srgbClr val="000000"/>
+                      </a:solidFill>
+                      <a:prstDash val="solid"/>
+                      <a:round/>
+                      <a:headEnd type="none" w="med" len="med"/>
+                      <a:tailEnd type="none" w="med" len="med"/>
+                    </a:lnR>
+                    <a:lnT w="6350" cap="flat" cmpd="sng" algn="ctr">
+                      <a:solidFill>
+                        <a:srgbClr val="000000"/>
+                      </a:solidFill>
+                      <a:prstDash val="solid"/>
+                      <a:round/>
+                      <a:headEnd type="none" w="med" len="med"/>
+                      <a:tailEnd type="none" w="med" len="med"/>
+                    </a:lnT>
+                    <a:lnB w="6350" cap="flat" cmpd="sng" algn="ctr">
+                      <a:solidFill>
+                        <a:srgbClr val="000000"/>
+                      </a:solidFill>
+                      <a:prstDash val="solid"/>
+                      <a:round/>
+                      <a:headEnd type="none" w="med" len="med"/>
+                      <a:tailEnd type="none" w="med" len="med"/>
+                    </a:lnB>
+                  </a:tcPr>
+                </a:tc>
+                <a:tc>
+                  <a:txBody>
+                    <a:bodyPr/>
+                    <a:lstStyle/>
+                    <a:p>
+                      <a:pPr algn="ctr" fontAlgn="ctr"/>
+                      <a:r>
+                        <a:rPr lang="en-US" sz="700" b="0" i="0" u="none" strike="noStrike">
+                          <a:solidFill>
+                            <a:srgbClr val="9C6500"/>
+                          </a:solidFill>
+                          <a:effectLst/>
+                          <a:latin typeface="Calibri"/>
+                        </a:rPr>
+                        <a:t>Amber</a:t>
+                      </a:r>
+                    </a:p>
+                  </a:txBody>
+                  <a:tcPr marL="0" marR="0" marT="0" marB="0" anchor="ctr">
+                    <a:lnL w="6350" cap="flat" cmpd="sng" algn="ctr">
+                      <a:solidFill>
+                        <a:srgbClr val="000000"/>
+                      </a:solidFill>
+                      <a:prstDash val="solid"/>
+                      <a:round/>
+                      <a:headEnd type="none" w="med" len="med"/>
+                      <a:tailEnd type="none" w="med" len="med"/>
+                    </a:lnL>
+                    <a:lnR w="12700" cap="flat" cmpd="sng" algn="ctr">
+                      <a:solidFill>
+                        <a:srgbClr val="000000"/>
+                      </a:solidFill>
+                      <a:prstDash val="solid"/>
+                      <a:round/>
+                      <a:headEnd type="none" w="med" len="med"/>
+                      <a:tailEnd type="none" w="med" len="med"/>
+                    </a:lnR>
+                    <a:lnT w="6350" cap="flat" cmpd="sng" algn="ctr">
+                      <a:solidFill>
+                        <a:srgbClr val="000000"/>
+                      </a:solidFill>
+                      <a:prstDash val="solid"/>
+                      <a:round/>
+                      <a:headEnd type="none" w="med" len="med"/>
+                      <a:tailEnd type="none" w="med" len="med"/>
+                    </a:lnT>
+                    <a:lnB w="6350" cap="flat" cmpd="sng" algn="ctr">
+                      <a:solidFill>
+                        <a:srgbClr val="000000"/>
+                      </a:solidFill>
+                      <a:prstDash val="solid"/>
+                      <a:round/>
+                      <a:headEnd type="none" w="med" len="med"/>
+                      <a:tailEnd type="none" w="med" len="med"/>
+                    </a:lnB>
+                    <a:solidFill>
+                      <a:srgbClr val="FFEB9C"/>
+                    </a:solidFill>
+                  </a:tcPr>
+                </a:tc>
+              </a:tr>
+              <a:tr h="893398">
+                <a:tc>
+                  <a:txBody>
+                    <a:bodyPr/>
+                    <a:lstStyle/>
+                    <a:p>
+                      <a:pPr algn="l" fontAlgn="ctr"/>
+                      <a:r>
+                        <a:rPr lang="en-US" sz="700" b="0" i="0" u="none" strike="noStrike">
+                          <a:solidFill>
+                            <a:srgbClr val="000000"/>
+                          </a:solidFill>
+                          <a:effectLst/>
+                          <a:latin typeface="Calibri"/>
+                        </a:rPr>
+                        <a:t>2</a:t>
+                      </a:r>
+                    </a:p>
+                  </a:txBody>
+                  <a:tcPr marL="0" marR="0" marT="0" marB="0" anchor="ctr">
+                    <a:lnL w="12700" cap="flat" cmpd="sng" algn="ctr">
+                      <a:solidFill>
+                        <a:srgbClr val="000000"/>
+                      </a:solidFill>
+                      <a:prstDash val="solid"/>
+                      <a:round/>
+                      <a:headEnd type="none" w="med" len="med"/>
+                      <a:tailEnd type="none" w="med" len="med"/>
+                    </a:lnL>
+                    <a:lnR w="6350" cap="flat" cmpd="sng" algn="ctr">
+                      <a:solidFill>
+                        <a:srgbClr val="000000"/>
+                      </a:solidFill>
+                      <a:prstDash val="solid"/>
+                      <a:round/>
+                      <a:headEnd type="none" w="med" len="med"/>
+                      <a:tailEnd type="none" w="med" len="med"/>
+                    </a:lnR>
+                    <a:lnT w="6350" cap="flat" cmpd="sng" algn="ctr">
+                      <a:solidFill>
+                        <a:srgbClr val="000000"/>
+                      </a:solidFill>
+                      <a:prstDash val="solid"/>
+                      <a:round/>
+                      <a:headEnd type="none" w="med" len="med"/>
+                      <a:tailEnd type="none" w="med" len="med"/>
+                    </a:lnT>
+                    <a:lnB w="6350" cap="flat" cmpd="sng" algn="ctr">
+                      <a:solidFill>
+                        <a:srgbClr val="000000"/>
+                      </a:solidFill>
+                      <a:prstDash val="solid"/>
+                      <a:round/>
+                      <a:headEnd type="none" w="med" len="med"/>
+                      <a:tailEnd type="none" w="med" len="med"/>
+                    </a:lnB>
+                  </a:tcPr>
+                </a:tc>
+                <a:tc>
+                  <a:txBody>
+                    <a:bodyPr/>
+                    <a:lstStyle/>
+                    <a:p>
+                      <a:pPr algn="l" fontAlgn="ctr"/>
+                      <a:r>
+                        <a:rPr lang="en-US" sz="700" b="0" i="0" u="none" strike="noStrike">
+                          <a:solidFill>
+                            <a:srgbClr val="000000"/>
+                          </a:solidFill>
+                          <a:effectLst/>
+                          <a:latin typeface="Calibri"/>
+                        </a:rPr>
+                        <a:t>Ongoing availability of partner organisation resources.</a:t>
+                      </a:r>
+                    </a:p>
+                  </a:txBody>
+                  <a:tcPr marL="0" marR="0" marT="0" marB="0" anchor="ctr">
+                    <a:lnL w="6350" cap="flat" cmpd="sng" algn="ctr">
+                      <a:solidFill>
+                        <a:srgbClr val="000000"/>
+                      </a:solidFill>
+                      <a:prstDash val="solid"/>
+                      <a:round/>
+                      <a:headEnd type="none" w="med" len="med"/>
+                      <a:tailEnd type="none" w="med" len="med"/>
+                    </a:lnL>
+                    <a:lnR w="6350" cap="flat" cmpd="sng" algn="ctr">
+                      <a:solidFill>
+                        <a:srgbClr val="000000"/>
+                      </a:solidFill>
+                      <a:prstDash val="solid"/>
+                      <a:round/>
+                      <a:headEnd type="none" w="med" len="med"/>
+                      <a:tailEnd type="none" w="med" len="med"/>
+                    </a:lnR>
+                    <a:lnT w="6350" cap="flat" cmpd="sng" algn="ctr">
+                      <a:solidFill>
+                        <a:srgbClr val="000000"/>
+                      </a:solidFill>
+                      <a:prstDash val="solid"/>
+                      <a:round/>
+                      <a:headEnd type="none" w="med" len="med"/>
+                      <a:tailEnd type="none" w="med" len="med"/>
+                    </a:lnT>
+                    <a:lnB w="6350" cap="flat" cmpd="sng" algn="ctr">
+                      <a:solidFill>
+                        <a:srgbClr val="000000"/>
+                      </a:solidFill>
+                      <a:prstDash val="solid"/>
+                      <a:round/>
+                      <a:headEnd type="none" w="med" len="med"/>
+                      <a:tailEnd type="none" w="med" len="med"/>
+                    </a:lnB>
+                  </a:tcPr>
+                </a:tc>
+                <a:tc>
+                  <a:txBody>
+                    <a:bodyPr/>
+                    <a:lstStyle/>
+                    <a:p>
+                      <a:pPr algn="l" fontAlgn="ctr"/>
+                      <a:r>
+                        <a:rPr lang="en-US" sz="700" b="0" i="0" u="none" strike="noStrike">
+                          <a:solidFill>
+                            <a:srgbClr val="000000"/>
+                          </a:solidFill>
+                          <a:effectLst/>
+                          <a:latin typeface="Calibri"/>
+                        </a:rPr>
+                        <a:t>Resourcing is not currently an issue.</a:t>
+                      </a:r>
+                    </a:p>
+                  </a:txBody>
+                  <a:tcPr marL="0" marR="0" marT="0" marB="0" anchor="ctr">
+                    <a:lnL w="6350" cap="flat" cmpd="sng" algn="ctr">
+                      <a:solidFill>
+                        <a:srgbClr val="000000"/>
+                      </a:solidFill>
+                      <a:prstDash val="solid"/>
+                      <a:round/>
+                      <a:headEnd type="none" w="med" len="med"/>
+                      <a:tailEnd type="none" w="med" len="med"/>
+                    </a:lnL>
+                    <a:lnR w="6350" cap="flat" cmpd="sng" algn="ctr">
+                      <a:solidFill>
+                        <a:srgbClr val="000000"/>
+                      </a:solidFill>
+                      <a:prstDash val="solid"/>
+                      <a:round/>
+                      <a:headEnd type="none" w="med" len="med"/>
+                      <a:tailEnd type="none" w="med" len="med"/>
+                    </a:lnR>
+                    <a:lnT w="6350" cap="flat" cmpd="sng" algn="ctr">
+                      <a:solidFill>
+                        <a:srgbClr val="000000"/>
+                      </a:solidFill>
+                      <a:prstDash val="solid"/>
+                      <a:round/>
+                      <a:headEnd type="none" w="med" len="med"/>
+                      <a:tailEnd type="none" w="med" len="med"/>
+                    </a:lnT>
+                    <a:lnB w="6350" cap="flat" cmpd="sng" algn="ctr">
+                      <a:solidFill>
+                        <a:srgbClr val="000000"/>
+                      </a:solidFill>
+                      <a:prstDash val="solid"/>
+                      <a:round/>
+                      <a:headEnd type="none" w="med" len="med"/>
+                      <a:tailEnd type="none" w="med" len="med"/>
+                    </a:lnB>
+                  </a:tcPr>
+                </a:tc>
+                <a:tc>
+                  <a:txBody>
+                    <a:bodyPr/>
+                    <a:lstStyle/>
+                    <a:p>
+                      <a:pPr algn="ctr" fontAlgn="ctr"/>
+                      <a:r>
+                        <a:rPr lang="en-US" sz="700" b="0" i="0" u="none" strike="noStrike">
+                          <a:solidFill>
+                            <a:srgbClr val="006100"/>
+                          </a:solidFill>
+                          <a:effectLst/>
+                          <a:latin typeface="Calibri"/>
+                        </a:rPr>
+                        <a:t>Green</a:t>
+                      </a:r>
+                    </a:p>
+                  </a:txBody>
+                  <a:tcPr marL="0" marR="0" marT="0" marB="0" anchor="ctr">
+                    <a:lnL w="6350" cap="flat" cmpd="sng" algn="ctr">
+                      <a:solidFill>
+                        <a:srgbClr val="000000"/>
+                      </a:solidFill>
+                      <a:prstDash val="solid"/>
+                      <a:round/>
+                      <a:headEnd type="none" w="med" len="med"/>
+                      <a:tailEnd type="none" w="med" len="med"/>
+                    </a:lnL>
+                    <a:lnR w="12700" cap="flat" cmpd="sng" algn="ctr">
+                      <a:solidFill>
+                        <a:srgbClr val="000000"/>
+                      </a:solidFill>
+                      <a:prstDash val="solid"/>
+                      <a:round/>
+                      <a:headEnd type="none" w="med" len="med"/>
+                      <a:tailEnd type="none" w="med" len="med"/>
+                    </a:lnR>
+                    <a:lnT w="6350" cap="flat" cmpd="sng" algn="ctr">
+                      <a:solidFill>
+                        <a:srgbClr val="000000"/>
+                      </a:solidFill>
+                      <a:prstDash val="solid"/>
+                      <a:round/>
+                      <a:headEnd type="none" w="med" len="med"/>
+                      <a:tailEnd type="none" w="med" len="med"/>
+                    </a:lnT>
+                    <a:lnB w="6350" cap="flat" cmpd="sng" algn="ctr">
+                      <a:solidFill>
+                        <a:srgbClr val="000000"/>
+                      </a:solidFill>
+                      <a:prstDash val="solid"/>
+                      <a:round/>
+                      <a:headEnd type="none" w="med" len="med"/>
+                      <a:tailEnd type="none" w="med" len="med"/>
+                    </a:lnB>
+                    <a:solidFill>
+                      <a:srgbClr val="C6EFCE"/>
+                    </a:solidFill>
+                  </a:tcPr>
+                </a:tc>
+              </a:tr>
+              <a:tr h="893398">
+                <a:tc>
+                  <a:txBody>
+                    <a:bodyPr/>
+                    <a:lstStyle/>
+                    <a:p>
+                      <a:pPr algn="l" fontAlgn="ctr"/>
+                      <a:r>
+                        <a:rPr lang="en-US" sz="700" b="0" i="0" u="none" strike="noStrike">
+                          <a:solidFill>
+                            <a:srgbClr val="000000"/>
+                          </a:solidFill>
+                          <a:effectLst/>
+                          <a:latin typeface="Calibri"/>
+                        </a:rPr>
+                        <a:t>3</a:t>
+                      </a:r>
+                    </a:p>
+                  </a:txBody>
+                  <a:tcPr marL="0" marR="0" marT="0" marB="0" anchor="ctr">
+                    <a:lnL w="12700" cap="flat" cmpd="sng" algn="ctr">
+                      <a:solidFill>
+                        <a:srgbClr val="000000"/>
+                      </a:solidFill>
+                      <a:prstDash val="solid"/>
+                      <a:round/>
+                      <a:headEnd type="none" w="med" len="med"/>
+                      <a:tailEnd type="none" w="med" len="med"/>
+                    </a:lnL>
+                    <a:lnR w="6350" cap="flat" cmpd="sng" algn="ctr">
+                      <a:solidFill>
+                        <a:srgbClr val="000000"/>
+                      </a:solidFill>
+                      <a:prstDash val="solid"/>
+                      <a:round/>
+                      <a:headEnd type="none" w="med" len="med"/>
+                      <a:tailEnd type="none" w="med" len="med"/>
+                    </a:lnR>
+                    <a:lnT w="6350" cap="flat" cmpd="sng" algn="ctr">
+                      <a:solidFill>
+                        <a:srgbClr val="000000"/>
+                      </a:solidFill>
+                      <a:prstDash val="solid"/>
+                      <a:round/>
+                      <a:headEnd type="none" w="med" len="med"/>
+                      <a:tailEnd type="none" w="med" len="med"/>
+                    </a:lnT>
+                    <a:lnB w="6350" cap="flat" cmpd="sng" algn="ctr">
+                      <a:solidFill>
+                        <a:srgbClr val="000000"/>
+                      </a:solidFill>
+                      <a:prstDash val="solid"/>
+                      <a:round/>
+                      <a:headEnd type="none" w="med" len="med"/>
+                      <a:tailEnd type="none" w="med" len="med"/>
+                    </a:lnB>
+                  </a:tcPr>
+                </a:tc>
+                <a:tc>
+                  <a:txBody>
+                    <a:bodyPr/>
+                    <a:lstStyle/>
+                    <a:p>
+                      <a:pPr algn="l" fontAlgn="ctr"/>
+                      <a:r>
+                        <a:rPr lang="en-US" sz="700" b="0" i="0" u="none" strike="noStrike">
+                          <a:solidFill>
+                            <a:srgbClr val="000000"/>
+                          </a:solidFill>
+                          <a:effectLst/>
+                          <a:latin typeface="Calibri"/>
+                        </a:rPr>
+                        <a:t>Availability RDSI, AAF and the Research Cloud.</a:t>
+                      </a:r>
+                    </a:p>
+                  </a:txBody>
+                  <a:tcPr marL="0" marR="0" marT="0" marB="0" anchor="ctr">
+                    <a:lnL w="6350" cap="flat" cmpd="sng" algn="ctr">
+                      <a:solidFill>
+                        <a:srgbClr val="000000"/>
+                      </a:solidFill>
+                      <a:prstDash val="solid"/>
+                      <a:round/>
+                      <a:headEnd type="none" w="med" len="med"/>
+                      <a:tailEnd type="none" w="med" len="med"/>
+                    </a:lnL>
+                    <a:lnR w="6350" cap="flat" cmpd="sng" algn="ctr">
+                      <a:solidFill>
+                        <a:srgbClr val="000000"/>
+                      </a:solidFill>
+                      <a:prstDash val="solid"/>
+                      <a:round/>
+                      <a:headEnd type="none" w="med" len="med"/>
+                      <a:tailEnd type="none" w="med" len="med"/>
+                    </a:lnR>
+                    <a:lnT w="6350" cap="flat" cmpd="sng" algn="ctr">
+                      <a:solidFill>
+                        <a:srgbClr val="000000"/>
+                      </a:solidFill>
+                      <a:prstDash val="solid"/>
+                      <a:round/>
+                      <a:headEnd type="none" w="med" len="med"/>
+                      <a:tailEnd type="none" w="med" len="med"/>
+                    </a:lnT>
+                    <a:lnB w="6350" cap="flat" cmpd="sng" algn="ctr">
+                      <a:solidFill>
+                        <a:srgbClr val="000000"/>
+                      </a:solidFill>
+                      <a:prstDash val="solid"/>
+                      <a:round/>
+                      <a:headEnd type="none" w="med" len="med"/>
+                      <a:tailEnd type="none" w="med" len="med"/>
+                    </a:lnB>
+                  </a:tcPr>
+                </a:tc>
+                <a:tc>
+                  <a:txBody>
+                    <a:bodyPr/>
+                    <a:lstStyle/>
+                    <a:p>
+                      <a:pPr algn="l" fontAlgn="ctr"/>
+                      <a:r>
+                        <a:rPr lang="en-US" sz="700" b="0" i="0" u="none" strike="noStrike">
+                          <a:solidFill>
+                            <a:srgbClr val="000000"/>
+                          </a:solidFill>
+                          <a:effectLst/>
+                          <a:latin typeface="Calibri"/>
+                        </a:rPr>
+                        <a:t>NSP stability is good. UWA will support use of UWA AAF services for production authentication.  This is going well but we now have a lot of studies and data and will need more processing power.  Travis to address this</a:t>
+                      </a:r>
+                    </a:p>
+                  </a:txBody>
+                  <a:tcPr marL="0" marR="0" marT="0" marB="0" anchor="ctr">
+                    <a:lnL w="6350" cap="flat" cmpd="sng" algn="ctr">
+                      <a:solidFill>
+                        <a:srgbClr val="000000"/>
+                      </a:solidFill>
+                      <a:prstDash val="solid"/>
+                      <a:round/>
+                      <a:headEnd type="none" w="med" len="med"/>
+                      <a:tailEnd type="none" w="med" len="med"/>
+                    </a:lnL>
+                    <a:lnR w="6350" cap="flat" cmpd="sng" algn="ctr">
+                      <a:solidFill>
+                        <a:srgbClr val="000000"/>
+                      </a:solidFill>
+                      <a:prstDash val="solid"/>
+                      <a:round/>
+                      <a:headEnd type="none" w="med" len="med"/>
+                      <a:tailEnd type="none" w="med" len="med"/>
+                    </a:lnR>
+                    <a:lnT w="6350" cap="flat" cmpd="sng" algn="ctr">
+                      <a:solidFill>
+                        <a:srgbClr val="000000"/>
+                      </a:solidFill>
+                      <a:prstDash val="solid"/>
+                      <a:round/>
+                      <a:headEnd type="none" w="med" len="med"/>
+                      <a:tailEnd type="none" w="med" len="med"/>
+                    </a:lnT>
+                    <a:lnB w="6350" cap="flat" cmpd="sng" algn="ctr">
+                      <a:solidFill>
+                        <a:srgbClr val="000000"/>
+                      </a:solidFill>
+                      <a:prstDash val="solid"/>
+                      <a:round/>
+                      <a:headEnd type="none" w="med" len="med"/>
+                      <a:tailEnd type="none" w="med" len="med"/>
+                    </a:lnB>
+                  </a:tcPr>
+                </a:tc>
+                <a:tc>
+                  <a:txBody>
+                    <a:bodyPr/>
+                    <a:lstStyle/>
+                    <a:p>
+                      <a:pPr algn="ctr" fontAlgn="ctr"/>
+                      <a:r>
+                        <a:rPr lang="en-US" sz="700" b="0" i="0" u="none" strike="noStrike">
+                          <a:solidFill>
+                            <a:srgbClr val="9C6500"/>
+                          </a:solidFill>
+                          <a:effectLst/>
+                          <a:latin typeface="Calibri"/>
+                        </a:rPr>
+                        <a:t>Amber</a:t>
+                      </a:r>
+                    </a:p>
+                  </a:txBody>
+                  <a:tcPr marL="0" marR="0" marT="0" marB="0" anchor="ctr">
+                    <a:lnL w="6350" cap="flat" cmpd="sng" algn="ctr">
+                      <a:solidFill>
+                        <a:srgbClr val="000000"/>
+                      </a:solidFill>
+                      <a:prstDash val="solid"/>
+                      <a:round/>
+                      <a:headEnd type="none" w="med" len="med"/>
+                      <a:tailEnd type="none" w="med" len="med"/>
+                    </a:lnL>
+                    <a:lnR w="12700" cap="flat" cmpd="sng" algn="ctr">
+                      <a:solidFill>
+                        <a:srgbClr val="000000"/>
+                      </a:solidFill>
+                      <a:prstDash val="solid"/>
+                      <a:round/>
+                      <a:headEnd type="none" w="med" len="med"/>
+                      <a:tailEnd type="none" w="med" len="med"/>
+                    </a:lnR>
+                    <a:lnT w="6350" cap="flat" cmpd="sng" algn="ctr">
+                      <a:solidFill>
+                        <a:srgbClr val="000000"/>
+                      </a:solidFill>
+                      <a:prstDash val="solid"/>
+                      <a:round/>
+                      <a:headEnd type="none" w="med" len="med"/>
+                      <a:tailEnd type="none" w="med" len="med"/>
+                    </a:lnT>
+                    <a:lnB w="6350" cap="flat" cmpd="sng" algn="ctr">
+                      <a:solidFill>
+                        <a:srgbClr val="000000"/>
+                      </a:solidFill>
+                      <a:prstDash val="solid"/>
+                      <a:round/>
+                      <a:headEnd type="none" w="med" len="med"/>
+                      <a:tailEnd type="none" w="med" len="med"/>
+                    </a:lnB>
+                    <a:solidFill>
+                      <a:srgbClr val="FFEB9C"/>
+                    </a:solidFill>
+                  </a:tcPr>
+                </a:tc>
+              </a:tr>
+              <a:tr h="893398">
+                <a:tc>
+                  <a:txBody>
+                    <a:bodyPr/>
+                    <a:lstStyle/>
+                    <a:p>
+                      <a:pPr algn="l" fontAlgn="ctr"/>
+                      <a:r>
+                        <a:rPr lang="en-US" sz="700" b="0" i="0" u="none" strike="noStrike">
+                          <a:solidFill>
+                            <a:srgbClr val="000000"/>
+                          </a:solidFill>
+                          <a:effectLst/>
+                          <a:latin typeface="Calibri"/>
+                        </a:rPr>
+                        <a:t>4</a:t>
+                      </a:r>
+                    </a:p>
+                  </a:txBody>
+                  <a:tcPr marL="0" marR="0" marT="0" marB="0" anchor="ctr">
+                    <a:lnL w="12700" cap="flat" cmpd="sng" algn="ctr">
+                      <a:solidFill>
+                        <a:srgbClr val="000000"/>
+                      </a:solidFill>
+                      <a:prstDash val="solid"/>
+                      <a:round/>
+                      <a:headEnd type="none" w="med" len="med"/>
+                      <a:tailEnd type="none" w="med" len="med"/>
+                    </a:lnL>
+                    <a:lnR w="6350" cap="flat" cmpd="sng" algn="ctr">
+                      <a:solidFill>
+                        <a:srgbClr val="000000"/>
+                      </a:solidFill>
+                      <a:prstDash val="solid"/>
+                      <a:round/>
+                      <a:headEnd type="none" w="med" len="med"/>
+                      <a:tailEnd type="none" w="med" len="med"/>
+                    </a:lnR>
+                    <a:lnT w="6350" cap="flat" cmpd="sng" algn="ctr">
+                      <a:solidFill>
+                        <a:srgbClr val="000000"/>
+                      </a:solidFill>
+                      <a:prstDash val="solid"/>
+                      <a:round/>
+                      <a:headEnd type="none" w="med" len="med"/>
+                      <a:tailEnd type="none" w="med" len="med"/>
+                    </a:lnT>
+                    <a:lnB w="12700" cap="flat" cmpd="sng" algn="ctr">
+                      <a:solidFill>
+                        <a:srgbClr val="000000"/>
+                      </a:solidFill>
+                      <a:prstDash val="solid"/>
+                      <a:round/>
+                      <a:headEnd type="none" w="med" len="med"/>
+                      <a:tailEnd type="none" w="med" len="med"/>
+                    </a:lnB>
+                  </a:tcPr>
+                </a:tc>
+                <a:tc>
+                  <a:txBody>
+                    <a:bodyPr/>
+                    <a:lstStyle/>
+                    <a:p>
+                      <a:pPr algn="l" fontAlgn="ctr"/>
+                      <a:r>
+                        <a:rPr lang="en-US" sz="700" b="0" i="0" u="none" strike="noStrike">
+                          <a:solidFill>
+                            <a:srgbClr val="000000"/>
+                          </a:solidFill>
+                          <a:effectLst/>
+                          <a:latin typeface="Calibri"/>
+                        </a:rPr>
+                        <a:t>Completeness of configuration documentation for new studies</a:t>
+                      </a:r>
+                    </a:p>
+                  </a:txBody>
+                  <a:tcPr marL="0" marR="0" marT="0" marB="0" anchor="ctr">
+                    <a:lnL w="6350" cap="flat" cmpd="sng" algn="ctr">
+                      <a:solidFill>
+                        <a:srgbClr val="000000"/>
+                      </a:solidFill>
+                      <a:prstDash val="solid"/>
+                      <a:round/>
+                      <a:headEnd type="none" w="med" len="med"/>
+                      <a:tailEnd type="none" w="med" len="med"/>
+                    </a:lnL>
+                    <a:lnR w="6350" cap="flat" cmpd="sng" algn="ctr">
+                      <a:solidFill>
+                        <a:srgbClr val="000000"/>
+                      </a:solidFill>
+                      <a:prstDash val="solid"/>
+                      <a:round/>
+                      <a:headEnd type="none" w="med" len="med"/>
+                      <a:tailEnd type="none" w="med" len="med"/>
+                    </a:lnR>
+                    <a:lnT w="6350" cap="flat" cmpd="sng" algn="ctr">
+                      <a:solidFill>
+                        <a:srgbClr val="000000"/>
+                      </a:solidFill>
+                      <a:prstDash val="solid"/>
+                      <a:round/>
+                      <a:headEnd type="none" w="med" len="med"/>
+                      <a:tailEnd type="none" w="med" len="med"/>
+                    </a:lnT>
+                    <a:lnB w="12700" cap="flat" cmpd="sng" algn="ctr">
+                      <a:solidFill>
+                        <a:srgbClr val="000000"/>
+                      </a:solidFill>
+                      <a:prstDash val="solid"/>
+                      <a:round/>
+                      <a:headEnd type="none" w="med" len="med"/>
+                      <a:tailEnd type="none" w="med" len="med"/>
+                    </a:lnB>
+                  </a:tcPr>
+                </a:tc>
+                <a:tc>
+                  <a:txBody>
+                    <a:bodyPr/>
+                    <a:lstStyle/>
+                    <a:p>
+                      <a:pPr algn="l" fontAlgn="ctr"/>
+                      <a:r>
+                        <a:rPr lang="en-US" sz="700" b="0" i="0" u="none" strike="noStrike">
+                          <a:solidFill>
+                            <a:srgbClr val="000000"/>
+                          </a:solidFill>
+                          <a:effectLst/>
+                          <a:latin typeface="Calibri"/>
+                        </a:rPr>
+                        <a:t>Pushing back on deployment dates to ensure clients have clearly documented their configuration requirements</a:t>
+                      </a:r>
+                    </a:p>
+                  </a:txBody>
+                  <a:tcPr marL="0" marR="0" marT="0" marB="0" anchor="ctr">
+                    <a:lnL w="6350" cap="flat" cmpd="sng" algn="ctr">
+                      <a:solidFill>
+                        <a:srgbClr val="000000"/>
+                      </a:solidFill>
+                      <a:prstDash val="solid"/>
+                      <a:round/>
+                      <a:headEnd type="none" w="med" len="med"/>
+                      <a:tailEnd type="none" w="med" len="med"/>
+                    </a:lnL>
+                    <a:lnR w="6350" cap="flat" cmpd="sng" algn="ctr">
+                      <a:solidFill>
+                        <a:srgbClr val="000000"/>
+                      </a:solidFill>
+                      <a:prstDash val="solid"/>
+                      <a:round/>
+                      <a:headEnd type="none" w="med" len="med"/>
+                      <a:tailEnd type="none" w="med" len="med"/>
+                    </a:lnR>
+                    <a:lnT w="6350" cap="flat" cmpd="sng" algn="ctr">
+                      <a:solidFill>
+                        <a:srgbClr val="000000"/>
+                      </a:solidFill>
+                      <a:prstDash val="solid"/>
+                      <a:round/>
+                      <a:headEnd type="none" w="med" len="med"/>
+                      <a:tailEnd type="none" w="med" len="med"/>
+                    </a:lnT>
+                    <a:lnB w="12700" cap="flat" cmpd="sng" algn="ctr">
+                      <a:solidFill>
+                        <a:srgbClr val="000000"/>
+                      </a:solidFill>
+                      <a:prstDash val="solid"/>
+                      <a:round/>
+                      <a:headEnd type="none" w="med" len="med"/>
+                      <a:tailEnd type="none" w="med" len="med"/>
+                    </a:lnB>
+                  </a:tcPr>
+                </a:tc>
+                <a:tc>
+                  <a:txBody>
+                    <a:bodyPr/>
+                    <a:lstStyle/>
+                    <a:p>
+                      <a:pPr algn="ctr" fontAlgn="ctr"/>
+                      <a:r>
+                        <a:rPr lang="en-US" sz="700" b="0" i="0" u="none" strike="noStrike" dirty="0">
+                          <a:solidFill>
+                            <a:srgbClr val="9C6500"/>
+                          </a:solidFill>
+                          <a:effectLst/>
+                          <a:latin typeface="Calibri"/>
+                        </a:rPr>
+                        <a:t>Amber</a:t>
+                      </a:r>
+                    </a:p>
+                  </a:txBody>
+                  <a:tcPr marL="0" marR="0" marT="0" marB="0" anchor="ctr">
+                    <a:lnL w="6350" cap="flat" cmpd="sng" algn="ctr">
+                      <a:solidFill>
+                        <a:srgbClr val="000000"/>
+                      </a:solidFill>
+                      <a:prstDash val="solid"/>
+                      <a:round/>
+                      <a:headEnd type="none" w="med" len="med"/>
+                      <a:tailEnd type="none" w="med" len="med"/>
+                    </a:lnL>
+                    <a:lnR w="12700" cap="flat" cmpd="sng" algn="ctr">
+                      <a:solidFill>
+                        <a:srgbClr val="000000"/>
+                      </a:solidFill>
+                      <a:prstDash val="solid"/>
+                      <a:round/>
+                      <a:headEnd type="none" w="med" len="med"/>
+                      <a:tailEnd type="none" w="med" len="med"/>
+                    </a:lnR>
+                    <a:lnT w="6350" cap="flat" cmpd="sng" algn="ctr">
+                      <a:solidFill>
+                        <a:srgbClr val="000000"/>
+                      </a:solidFill>
+                      <a:prstDash val="solid"/>
+                      <a:round/>
+                      <a:headEnd type="none" w="med" len="med"/>
+                      <a:tailEnd type="none" w="med" len="med"/>
+                    </a:lnT>
+                    <a:lnB w="12700" cap="flat" cmpd="sng" algn="ctr">
+                      <a:solidFill>
+                        <a:srgbClr val="000000"/>
+                      </a:solidFill>
+                      <a:prstDash val="solid"/>
+                      <a:round/>
+                      <a:headEnd type="none" w="med" len="med"/>
+                      <a:tailEnd type="none" w="med" len="med"/>
+                    </a:lnB>
+                    <a:solidFill>
+                      <a:srgbClr val="FFEB9C"/>
+                    </a:solidFill>
+                  </a:tcPr>
+                </a:tc>
+              </a:tr>
+            </a:tbl>
+          </a:graphicData>
+        </a:graphic>
+      </p:graphicFrame>
     </p:spTree>
   </p:cSld>
   <p:clrMapOvr>

</xml_diff>

<commit_message>
a whole lot more steering committee documentation and reports
git-svn-id: https://ark-informatics.googlecode.com/svn/ARK/trunk@8255 2beaffb7-5388-1629-0768-26d37724f1fc
</commit_message>
<xml_diff>
--- a/usefulTools/TestFilesAndDocuments/steering committee/NeCTAR/Steering Committee Meetings/Steering Committee Meeting June_2013.pptx
+++ b/usefulTools/TestFilesAndDocuments/steering committee/NeCTAR/Steering Committee Meetings/Steering Committee Meeting June_2013.pptx
@@ -5,7 +5,7 @@
     <p:sldMasterId id="2147484015" r:id="rId1"/>
   </p:sldMasterIdLst>
   <p:notesMasterIdLst>
-    <p:notesMasterId r:id="rId15"/>
+    <p:notesMasterId r:id="rId16"/>
   </p:notesMasterIdLst>
   <p:sldIdLst>
     <p:sldId id="256" r:id="rId2"/>
@@ -13,14 +13,15 @@
     <p:sldId id="319" r:id="rId4"/>
     <p:sldId id="307" r:id="rId5"/>
     <p:sldId id="318" r:id="rId6"/>
-    <p:sldId id="310" r:id="rId7"/>
-    <p:sldId id="322" r:id="rId8"/>
-    <p:sldId id="311" r:id="rId9"/>
-    <p:sldId id="313" r:id="rId10"/>
-    <p:sldId id="324" r:id="rId11"/>
-    <p:sldId id="320" r:id="rId12"/>
-    <p:sldId id="321" r:id="rId13"/>
-    <p:sldId id="323" r:id="rId14"/>
+    <p:sldId id="325" r:id="rId7"/>
+    <p:sldId id="310" r:id="rId8"/>
+    <p:sldId id="322" r:id="rId9"/>
+    <p:sldId id="311" r:id="rId10"/>
+    <p:sldId id="313" r:id="rId11"/>
+    <p:sldId id="324" r:id="rId12"/>
+    <p:sldId id="320" r:id="rId13"/>
+    <p:sldId id="321" r:id="rId14"/>
+    <p:sldId id="323" r:id="rId15"/>
   </p:sldIdLst>
   <p:sldSz cx="9144000" cy="6858000" type="screen4x3"/>
   <p:notesSz cx="6797675" cy="9926638"/>
@@ -4225,7 +4226,7 @@
       </p:grpSpPr>
       <p:sp>
         <p:nvSpPr>
-          <p:cNvPr id="2" name="Title 1"/>
+          <p:cNvPr id="87" name="Title 86"/>
           <p:cNvSpPr>
             <a:spLocks noGrp="1"/>
           </p:cNvSpPr>
@@ -4242,47 +4243,133 @@
           <a:p>
             <a:r>
               <a:rPr lang="en-US" dirty="0" smtClean="0"/>
-              <a:t>Some numbers</a:t>
+              <a:t>Other Business</a:t>
             </a:r>
             <a:endParaRPr lang="en-US" dirty="0"/>
           </a:p>
         </p:txBody>
       </p:sp>
-      <p:pic>
-        <p:nvPicPr>
-          <p:cNvPr id="8" name="Content Placeholder 7" descr="Screen shot 2013-07-12 at 6.04.02 AM.png"/>
-          <p:cNvPicPr>
-            <a:picLocks noGrp="1" noChangeAspect="1"/>
-          </p:cNvPicPr>
+      <p:sp>
+        <p:nvSpPr>
+          <p:cNvPr id="4" name="Content Placeholder 2"/>
+          <p:cNvSpPr>
+            <a:spLocks noGrp="1"/>
+          </p:cNvSpPr>
           <p:nvPr>
             <p:ph sz="quarter" idx="1"/>
           </p:nvPr>
-        </p:nvPicPr>
-        <p:blipFill>
-          <a:blip r:embed="rId2">
-            <a:extLst>
-              <a:ext uri="{28A0092B-C50C-407E-A947-70E740481C1C}">
-                <a14:useLocalDpi xmlns:a14="http://schemas.microsoft.com/office/drawing/2010/main" val="0"/>
-              </a:ext>
-            </a:extLst>
-          </a:blip>
-          <a:srcRect l="1815" r="1815"/>
-          <a:stretch>
-            <a:fillRect/>
-          </a:stretch>
-        </p:blipFill>
-        <p:spPr/>
-      </p:pic>
+        </p:nvSpPr>
+        <p:spPr>
+          <a:xfrm>
+            <a:off x="386512" y="1600200"/>
+            <a:ext cx="8613696" cy="5078498"/>
+          </a:xfrm>
+        </p:spPr>
+        <p:txBody>
+          <a:bodyPr>
+            <a:normAutofit fontScale="77500" lnSpcReduction="20000"/>
+          </a:bodyPr>
+          <a:lstStyle/>
+          <a:p>
+            <a:pPr lvl="0"/>
+            <a:r>
+              <a:rPr lang="en-AU" dirty="0" err="1" smtClean="0"/>
+              <a:t>SPArk</a:t>
+            </a:r>
+            <a:r>
+              <a:rPr lang="en-AU" dirty="0" smtClean="0"/>
+              <a:t> Grant </a:t>
+            </a:r>
+            <a:r>
+              <a:rPr lang="en-AU" dirty="0" smtClean="0"/>
+              <a:t>to </a:t>
+            </a:r>
+            <a:r>
+              <a:rPr lang="en-AU" dirty="0" smtClean="0"/>
+              <a:t>facilitate super computer analysis routines from within the </a:t>
+            </a:r>
+            <a:r>
+              <a:rPr lang="en-AU" dirty="0" smtClean="0"/>
+              <a:t>ARK completed.  Returned responses to evaluators questions.</a:t>
+            </a:r>
+          </a:p>
+          <a:p>
+            <a:pPr lvl="0"/>
+            <a:r>
+              <a:rPr lang="en-AU" dirty="0" smtClean="0"/>
+              <a:t>Migrated 21 Studies from WARTN.  One month of successful production use and positive responses </a:t>
+            </a:r>
+          </a:p>
+          <a:p>
+            <a:pPr lvl="1"/>
+            <a:r>
+              <a:rPr lang="en-AU" dirty="0" smtClean="0"/>
+              <a:t>Despite great response, there is still work/requests in place as a result of increased use and testing.</a:t>
+            </a:r>
+            <a:endParaRPr lang="en-AU" dirty="0" smtClean="0"/>
+          </a:p>
+          <a:p>
+            <a:pPr lvl="0"/>
+            <a:r>
+              <a:rPr lang="en-AU" dirty="0" smtClean="0"/>
+              <a:t>Date for next meeting – </a:t>
+            </a:r>
+            <a:r>
+              <a:rPr lang="en-AU" dirty="0" smtClean="0"/>
+              <a:t>mid September, 2013 to pre-empt report, or after report Mid October?</a:t>
+            </a:r>
+          </a:p>
+          <a:p>
+            <a:pPr lvl="0"/>
+            <a:r>
+              <a:rPr lang="en-AU" dirty="0" smtClean="0"/>
+              <a:t>Travis and Adrian have been in talks and providing presentations with potential new users.  Advice on how to reach out to others welcome.</a:t>
+            </a:r>
+          </a:p>
+          <a:p>
+            <a:pPr lvl="0"/>
+            <a:r>
+              <a:rPr lang="en-AU" dirty="0" smtClean="0"/>
+              <a:t>We welcome suggestions on how this project can fund salaries to continue to expand and be used.</a:t>
+            </a:r>
+            <a:endParaRPr lang="en-AU" dirty="0" smtClean="0"/>
+          </a:p>
+          <a:p>
+            <a:r>
+              <a:rPr lang="en-US" dirty="0" smtClean="0"/>
+              <a:t>Update on proposed operational </a:t>
+            </a:r>
+            <a:r>
+              <a:rPr lang="en-US" dirty="0" smtClean="0"/>
+              <a:t>improvements </a:t>
+            </a:r>
+            <a:r>
+              <a:rPr lang="en-US" dirty="0" smtClean="0"/>
+              <a:t>from last meeting</a:t>
+            </a:r>
+            <a:r>
+              <a:rPr lang="en-US" dirty="0" smtClean="0"/>
+              <a:t>;</a:t>
+            </a:r>
+            <a:endParaRPr lang="en-US" dirty="0" smtClean="0"/>
+          </a:p>
+          <a:p>
+            <a:endParaRPr lang="en-US" dirty="0" smtClean="0"/>
+          </a:p>
+        </p:txBody>
+      </p:sp>
     </p:spTree>
-    <p:extLst>
-      <p:ext uri="{BB962C8B-B14F-4D97-AF65-F5344CB8AC3E}">
-        <p14:creationId xmlns:p14="http://schemas.microsoft.com/office/powerpoint/2010/main" val="1039463268"/>
-      </p:ext>
-    </p:extLst>
   </p:cSld>
   <p:clrMapOvr>
     <a:masterClrMapping/>
   </p:clrMapOvr>
+  <p:timing>
+    <p:tnLst>
+      <p:par>
+        <p:cTn xmlns:p14="http://schemas.microsoft.com/office/powerpoint/2010/main" id="1" dur="indefinite" restart="never" nodeType="tmRoot"/>
+      </p:par>
+    </p:tnLst>
+  </p:timing>
 </p:sld>
 </file>
 
@@ -4315,92 +4402,54 @@
         </p:nvSpPr>
         <p:spPr/>
         <p:txBody>
-          <a:bodyPr/>
-          <a:lstStyle/>
-          <a:p>
-            <a:r>
-              <a:rPr lang="en-AU" dirty="0" smtClean="0"/>
-              <a:t>Approach Going Forward</a:t>
-            </a:r>
-            <a:endParaRPr lang="en-AU" dirty="0"/>
-          </a:p>
-        </p:txBody>
-      </p:sp>
-      <p:sp>
-        <p:nvSpPr>
-          <p:cNvPr id="3" name="Content Placeholder 2"/>
-          <p:cNvSpPr>
-            <a:spLocks noGrp="1"/>
-          </p:cNvSpPr>
-          <p:nvPr>
-            <p:ph sz="quarter" idx="1"/>
-          </p:nvPr>
-        </p:nvSpPr>
-        <p:spPr>
-          <a:xfrm>
-            <a:off x="349701" y="1600200"/>
-            <a:ext cx="8576886" cy="4869004"/>
-          </a:xfrm>
-        </p:spPr>
-        <p:txBody>
           <a:bodyPr>
             <a:normAutofit/>
           </a:bodyPr>
           <a:lstStyle/>
           <a:p>
             <a:r>
-              <a:rPr lang="en-AU" dirty="0" smtClean="0"/>
-              <a:t>Transparency – all projects and subcomponents will be estimated and tracked on </a:t>
-            </a:r>
-            <a:r>
-              <a:rPr lang="en-AU" dirty="0" err="1" smtClean="0"/>
-              <a:t>Atlassian</a:t>
-            </a:r>
-            <a:r>
-              <a:rPr lang="en-AU" dirty="0" smtClean="0"/>
-              <a:t>/JIRA.</a:t>
-            </a:r>
-          </a:p>
-          <a:p>
-            <a:pPr lvl="1"/>
-            <a:r>
-              <a:rPr lang="en-AU" dirty="0" smtClean="0"/>
-              <a:t>Our actual users are actively using </a:t>
-            </a:r>
-            <a:r>
-              <a:rPr lang="en-AU" dirty="0" err="1" smtClean="0"/>
-              <a:t>Atlassian</a:t>
-            </a:r>
-            <a:r>
-              <a:rPr lang="en-AU" dirty="0" smtClean="0"/>
-              <a:t> and there is good communications on all matters.</a:t>
-            </a:r>
-          </a:p>
-          <a:p>
-            <a:pPr lvl="1"/>
-            <a:r>
-              <a:rPr lang="en-AU" dirty="0" smtClean="0"/>
-              <a:t>We may still have an image issue from previous promises on dates not being met.  This transparency and the strict policy on honest, transparent evaluation is working to fix that.</a:t>
-            </a:r>
-            <a:endParaRPr lang="en-AU" dirty="0" smtClean="0"/>
-          </a:p>
-          <a:p>
-            <a:endParaRPr lang="en-AU" dirty="0"/>
-          </a:p>
-        </p:txBody>
-      </p:sp>
+              <a:rPr lang="en-US" dirty="0" smtClean="0"/>
+              <a:t>Some numbers</a:t>
+            </a:r>
+            <a:endParaRPr lang="en-US" dirty="0"/>
+          </a:p>
+        </p:txBody>
+      </p:sp>
+      <p:pic>
+        <p:nvPicPr>
+          <p:cNvPr id="8" name="Content Placeholder 7" descr="Screen shot 2013-07-12 at 6.04.02 AM.png"/>
+          <p:cNvPicPr>
+            <a:picLocks noGrp="1" noChangeAspect="1"/>
+          </p:cNvPicPr>
+          <p:nvPr>
+            <p:ph sz="quarter" idx="1"/>
+          </p:nvPr>
+        </p:nvPicPr>
+        <p:blipFill>
+          <a:blip r:embed="rId2">
+            <a:extLst>
+              <a:ext uri="{28A0092B-C50C-407E-A947-70E740481C1C}">
+                <a14:useLocalDpi xmlns:a14="http://schemas.microsoft.com/office/drawing/2010/main" val="0"/>
+              </a:ext>
+            </a:extLst>
+          </a:blip>
+          <a:srcRect t="-1884" b="-1884"/>
+          <a:stretch>
+            <a:fillRect/>
+          </a:stretch>
+        </p:blipFill>
+        <p:spPr/>
+      </p:pic>
     </p:spTree>
+    <p:extLst>
+      <p:ext uri="{BB962C8B-B14F-4D97-AF65-F5344CB8AC3E}">
+        <p14:creationId xmlns:p14="http://schemas.microsoft.com/office/powerpoint/2010/main" val="1039463268"/>
+      </p:ext>
+    </p:extLst>
   </p:cSld>
   <p:clrMapOvr>
     <a:masterClrMapping/>
   </p:clrMapOvr>
-  <p:timing>
-    <p:tnLst>
-      <p:par>
-        <p:cTn xmlns:p14="http://schemas.microsoft.com/office/powerpoint/2010/main" id="1" dur="indefinite" restart="never" nodeType="tmRoot"/>
-      </p:par>
-    </p:tnLst>
-  </p:timing>
 </p:sld>
 </file>
 
@@ -4454,7 +4503,12 @@
             <p:ph sz="quarter" idx="1"/>
           </p:nvPr>
         </p:nvSpPr>
-        <p:spPr/>
+        <p:spPr>
+          <a:xfrm>
+            <a:off x="349701" y="1600200"/>
+            <a:ext cx="8576886" cy="4869004"/>
+          </a:xfrm>
+        </p:spPr>
         <p:txBody>
           <a:bodyPr>
             <a:normAutofit/>
@@ -4463,23 +4517,41 @@
           <a:p>
             <a:r>
               <a:rPr lang="en-AU" dirty="0" smtClean="0"/>
-              <a:t>Prioritization – this project is already at or beyond full capacity.  Feature requests are welcomed via the JIRA system.  However, </a:t>
-            </a:r>
-            <a:r>
-              <a:rPr lang="en-AU" b="1" dirty="0" smtClean="0"/>
-              <a:t>everything</a:t>
+              <a:t>Transparency – all projects and subcomponents will be estimated and tracked on </a:t>
+            </a:r>
+            <a:r>
+              <a:rPr lang="en-AU" dirty="0" err="1" smtClean="0"/>
+              <a:t>Atlassian</a:t>
             </a:r>
             <a:r>
               <a:rPr lang="en-AU" dirty="0" smtClean="0"/>
-              <a:t> will need to be prioritized.  </a:t>
+              <a:t>/JIRA.</a:t>
             </a:r>
           </a:p>
           <a:p>
             <a:pPr lvl="1"/>
             <a:r>
               <a:rPr lang="en-AU" dirty="0" smtClean="0"/>
-              <a:t>We have been making great progress on fixing what needs to be fixed and users have been great accepting the need of prioritization and evaluating needs and wants.  The projects is catching up on timelines as a result and users are very happy.</a:t>
-            </a:r>
+              <a:t>Our actual users are actively using </a:t>
+            </a:r>
+            <a:r>
+              <a:rPr lang="en-AU" dirty="0" err="1" smtClean="0"/>
+              <a:t>Atlassian</a:t>
+            </a:r>
+            <a:r>
+              <a:rPr lang="en-AU" dirty="0" smtClean="0"/>
+              <a:t> and there is good communications on all matters.</a:t>
+            </a:r>
+          </a:p>
+          <a:p>
+            <a:pPr lvl="1"/>
+            <a:r>
+              <a:rPr lang="en-AU" dirty="0" smtClean="0"/>
+              <a:t>We may still have an image issue from previous promises on dates not being met.  This transparency and the strict policy on honest, transparent evaluation is working to fix that.</a:t>
+            </a:r>
+            <a:endParaRPr lang="en-AU" dirty="0" smtClean="0"/>
+          </a:p>
+          <a:p>
             <a:endParaRPr lang="en-AU" dirty="0"/>
           </a:p>
         </p:txBody>
@@ -4500,6 +4572,101 @@
 </file>
 
 <file path=ppt/slides/slide13.xml><?xml version="1.0" encoding="utf-8"?>
+<p:sld xmlns:a="http://schemas.openxmlformats.org/drawingml/2006/main" xmlns:r="http://schemas.openxmlformats.org/officeDocument/2006/relationships" xmlns:p="http://schemas.openxmlformats.org/presentationml/2006/main">
+  <p:cSld>
+    <p:spTree>
+      <p:nvGrpSpPr>
+        <p:cNvPr id="1" name=""/>
+        <p:cNvGrpSpPr/>
+        <p:nvPr/>
+      </p:nvGrpSpPr>
+      <p:grpSpPr>
+        <a:xfrm>
+          <a:off x="0" y="0"/>
+          <a:ext cx="0" cy="0"/>
+          <a:chOff x="0" y="0"/>
+          <a:chExt cx="0" cy="0"/>
+        </a:xfrm>
+      </p:grpSpPr>
+      <p:sp>
+        <p:nvSpPr>
+          <p:cNvPr id="2" name="Title 1"/>
+          <p:cNvSpPr>
+            <a:spLocks noGrp="1"/>
+          </p:cNvSpPr>
+          <p:nvPr>
+            <p:ph type="title"/>
+          </p:nvPr>
+        </p:nvSpPr>
+        <p:spPr/>
+        <p:txBody>
+          <a:bodyPr/>
+          <a:lstStyle/>
+          <a:p>
+            <a:r>
+              <a:rPr lang="en-AU" dirty="0" smtClean="0"/>
+              <a:t>Approach Going Forward</a:t>
+            </a:r>
+            <a:endParaRPr lang="en-AU" dirty="0"/>
+          </a:p>
+        </p:txBody>
+      </p:sp>
+      <p:sp>
+        <p:nvSpPr>
+          <p:cNvPr id="3" name="Content Placeholder 2"/>
+          <p:cNvSpPr>
+            <a:spLocks noGrp="1"/>
+          </p:cNvSpPr>
+          <p:nvPr>
+            <p:ph sz="quarter" idx="1"/>
+          </p:nvPr>
+        </p:nvSpPr>
+        <p:spPr/>
+        <p:txBody>
+          <a:bodyPr>
+            <a:normAutofit/>
+          </a:bodyPr>
+          <a:lstStyle/>
+          <a:p>
+            <a:r>
+              <a:rPr lang="en-AU" dirty="0" smtClean="0"/>
+              <a:t>Prioritization – this project is already at or beyond full capacity.  Feature requests are welcomed via the JIRA system.  However, </a:t>
+            </a:r>
+            <a:r>
+              <a:rPr lang="en-AU" b="1" dirty="0" smtClean="0"/>
+              <a:t>everything</a:t>
+            </a:r>
+            <a:r>
+              <a:rPr lang="en-AU" dirty="0" smtClean="0"/>
+              <a:t> will need to be prioritized.  </a:t>
+            </a:r>
+          </a:p>
+          <a:p>
+            <a:pPr lvl="1"/>
+            <a:r>
+              <a:rPr lang="en-AU" dirty="0" smtClean="0"/>
+              <a:t>We have been making great progress on fixing what needs to be fixed and users have been great accepting the need of prioritization and evaluating needs and wants.  The projects is catching up on timelines as a result and users are very happy.</a:t>
+            </a:r>
+            <a:endParaRPr lang="en-AU" dirty="0"/>
+          </a:p>
+        </p:txBody>
+      </p:sp>
+    </p:spTree>
+  </p:cSld>
+  <p:clrMapOvr>
+    <a:masterClrMapping/>
+  </p:clrMapOvr>
+  <p:timing>
+    <p:tnLst>
+      <p:par>
+        <p:cTn xmlns:p14="http://schemas.microsoft.com/office/powerpoint/2010/main" id="1" dur="indefinite" restart="never" nodeType="tmRoot"/>
+      </p:par>
+    </p:tnLst>
+  </p:timing>
+</p:sld>
+</file>
+
+<file path=ppt/slides/slide14.xml><?xml version="1.0" encoding="utf-8"?>
 <p:sld xmlns:a="http://schemas.openxmlformats.org/drawingml/2006/main" xmlns:r="http://schemas.openxmlformats.org/officeDocument/2006/relationships" xmlns:p="http://schemas.openxmlformats.org/presentationml/2006/main">
   <p:cSld>
     <p:spTree>
@@ -4797,14 +4964,14 @@
           <p:nvPr>
             <p:extLst>
               <p:ext uri="{D42A27DB-BD31-4B8C-83A1-F6EECF244321}">
-                <p14:modId xmlns:p14="http://schemas.microsoft.com/office/powerpoint/2010/main" val="1207531590"/>
+                <p14:modId xmlns:p14="http://schemas.microsoft.com/office/powerpoint/2010/main" val="3583593372"/>
               </p:ext>
             </p:extLst>
           </p:nvPr>
         </p:nvGraphicFramePr>
         <p:xfrm>
           <a:off x="612645" y="1193277"/>
-          <a:ext cx="8344542" cy="5613399"/>
+          <a:ext cx="8344542" cy="4851400"/>
         </p:xfrm>
         <a:graphic>
           <a:graphicData uri="http://schemas.openxmlformats.org/drawingml/2006/table">
@@ -4853,7 +5020,7 @@
                     <a:lstStyle/>
                     <a:p>
                       <a:r>
-                        <a:rPr kumimoji="0" lang="en-US" sz="1800" kern="1200" dirty="0" smtClean="0">
+                        <a:rPr kumimoji="0" lang="en-US" sz="1500" kern="1200" dirty="0" smtClean="0">
                           <a:solidFill>
                             <a:schemeClr val="dk1"/>
                           </a:solidFill>
@@ -4865,12 +5032,12 @@
                         <a:t>Travis Endersby to begin blogging, will continue to blog significant milestones and progress</a:t>
                       </a:r>
                       <a:r>
-                        <a:rPr lang="en-US" sz="1600" dirty="0" smtClean="0">
+                        <a:rPr lang="en-US" sz="1500" dirty="0" smtClean="0">
                           <a:effectLst/>
                         </a:rPr>
                         <a:t> </a:t>
                       </a:r>
-                      <a:endParaRPr kumimoji="0" lang="en-AU" sz="1600" kern="1200" dirty="0" smtClean="0">
+                      <a:endParaRPr kumimoji="0" lang="en-AU" sz="1500" kern="1200" dirty="0" smtClean="0">
                         <a:solidFill>
                           <a:schemeClr val="dk1"/>
                         </a:solidFill>
@@ -4888,30 +5055,30 @@
                     <a:lstStyle/>
                     <a:p>
                       <a:r>
-                        <a:rPr lang="en-AU" sz="1600" dirty="0" smtClean="0"/>
+                        <a:rPr lang="en-AU" sz="1500" dirty="0" smtClean="0"/>
                         <a:t>4 blogs in past 3</a:t>
                       </a:r>
                       <a:r>
-                        <a:rPr lang="en-AU" sz="1600" baseline="0" dirty="0" smtClean="0"/>
+                        <a:rPr lang="en-AU" sz="1500" baseline="0" dirty="0" smtClean="0"/>
                         <a:t> months.  I believe this is adequate for now given the current readership.  I have concluded new tools are necessary to get further reach.  </a:t>
                       </a:r>
                       <a:r>
-                        <a:rPr lang="en-AU" sz="1600" baseline="0" dirty="0" err="1" smtClean="0"/>
+                        <a:rPr lang="en-AU" sz="1500" baseline="0" dirty="0" err="1" smtClean="0"/>
                         <a:t>GOHaD</a:t>
                       </a:r>
                       <a:r>
-                        <a:rPr lang="en-AU" sz="1600" baseline="0" dirty="0" smtClean="0"/>
+                        <a:rPr lang="en-AU" sz="1500" baseline="0" dirty="0" smtClean="0"/>
                         <a:t> will begin twitter and </a:t>
                       </a:r>
                       <a:r>
-                        <a:rPr lang="en-AU" sz="1600" baseline="0" dirty="0" err="1" smtClean="0"/>
+                        <a:rPr lang="en-AU" sz="1500" baseline="0" dirty="0" err="1" smtClean="0"/>
                         <a:t>facebook</a:t>
                       </a:r>
                       <a:r>
-                        <a:rPr lang="en-AU" sz="1600" baseline="0" dirty="0" smtClean="0"/>
+                        <a:rPr lang="en-AU" sz="1500" baseline="0" dirty="0" smtClean="0"/>
                         <a:t> communications also, which our group will contribute to regularly</a:t>
                       </a:r>
-                      <a:endParaRPr lang="en-AU" sz="1600" dirty="0"/>
+                      <a:endParaRPr lang="en-AU" sz="1500" dirty="0"/>
                     </a:p>
                   </a:txBody>
                   <a:tcPr/>
@@ -4924,7 +5091,7 @@
                     <a:lstStyle/>
                     <a:p>
                       <a:r>
-                        <a:rPr kumimoji="0" lang="en-AU" sz="1400" kern="1200" dirty="0" smtClean="0">
+                        <a:rPr kumimoji="0" lang="en-AU" sz="1500" kern="1200" dirty="0" smtClean="0">
                           <a:solidFill>
                             <a:schemeClr val="dk1"/>
                           </a:solidFill>
@@ -4936,7 +5103,7 @@
                         <a:t>Nigel suggested Travis Endersby provide an interim</a:t>
                       </a:r>
                       <a:r>
-                        <a:rPr kumimoji="0" lang="en-AU" sz="1400" kern="1200" baseline="0" dirty="0" smtClean="0">
+                        <a:rPr kumimoji="0" lang="en-AU" sz="1500" kern="1200" baseline="0" dirty="0" smtClean="0">
                           <a:solidFill>
                             <a:schemeClr val="dk1"/>
                           </a:solidFill>
@@ -4945,9 +5112,9 @@
                           <a:ea typeface="+mn-ea"/>
                           <a:cs typeface="+mn-cs"/>
                         </a:rPr>
-                        <a:t> report to ensure project was back on the newly revised schedule upon the next due milestone. </a:t>
+                        <a:t> report to ensure project was back on the newly revised schedule upon reaching the next due milestone. </a:t>
                       </a:r>
-                      <a:endParaRPr kumimoji="0" lang="en-US" sz="1400" kern="1200" dirty="0" smtClean="0">
+                      <a:endParaRPr kumimoji="0" lang="en-US" sz="1500" kern="1200" dirty="0" smtClean="0">
                         <a:solidFill>
                           <a:schemeClr val="dk1"/>
                         </a:solidFill>
@@ -4966,10 +5133,10 @@
                     <a:lstStyle/>
                     <a:p>
                       <a:r>
-                        <a:rPr lang="en-AU" sz="1600" dirty="0" smtClean="0"/>
+                        <a:rPr lang="en-AU" sz="1500" dirty="0" smtClean="0"/>
                         <a:t>Done.</a:t>
                       </a:r>
-                      <a:endParaRPr lang="en-AU" sz="1600" dirty="0"/>
+                      <a:endParaRPr lang="en-AU" sz="1500" dirty="0"/>
                     </a:p>
                   </a:txBody>
                   <a:tcPr/>
@@ -4982,7 +5149,7 @@
                     <a:lstStyle/>
                     <a:p>
                       <a:r>
-                        <a:rPr kumimoji="0" lang="en-AU" sz="1600" kern="1200" dirty="0" smtClean="0">
+                        <a:rPr kumimoji="0" lang="en-AU" sz="1500" kern="1200" dirty="0" smtClean="0">
                           <a:solidFill>
                             <a:schemeClr val="dk1"/>
                           </a:solidFill>
@@ -4994,7 +5161,7 @@
                         <a:t>Once</a:t>
                       </a:r>
                       <a:r>
-                        <a:rPr kumimoji="0" lang="en-AU" sz="1600" kern="1200" baseline="0" dirty="0" smtClean="0">
+                        <a:rPr kumimoji="0" lang="en-AU" sz="1500" kern="1200" baseline="0" dirty="0" smtClean="0">
                           <a:solidFill>
                             <a:schemeClr val="dk1"/>
                           </a:solidFill>
@@ -5006,7 +5173,7 @@
                         <a:t> project back on schedule, d</a:t>
                       </a:r>
                       <a:r>
-                        <a:rPr kumimoji="0" lang="en-AU" sz="1600" kern="1200" dirty="0" smtClean="0">
+                        <a:rPr kumimoji="0" lang="en-AU" sz="1500" kern="1200" dirty="0" smtClean="0">
                           <a:solidFill>
                             <a:schemeClr val="dk1"/>
                           </a:solidFill>
@@ -5018,7 +5185,7 @@
                         <a:t>evelop </a:t>
                       </a:r>
                       <a:r>
-                        <a:rPr kumimoji="0" lang="en-AU" sz="1600" kern="1200" dirty="0" smtClean="0">
+                        <a:rPr kumimoji="0" lang="en-AU" sz="1500" kern="1200" dirty="0" smtClean="0">
                           <a:solidFill>
                             <a:schemeClr val="dk1"/>
                           </a:solidFill>
@@ -5029,7 +5196,7 @@
                         </a:rPr>
                         <a:t>a timeline for broader user access to the tools.</a:t>
                       </a:r>
-                      <a:endParaRPr kumimoji="0" lang="en-US" sz="1600" kern="1200" dirty="0">
+                      <a:endParaRPr kumimoji="0" lang="en-US" sz="1500" kern="1200" dirty="0">
                         <a:solidFill>
                           <a:schemeClr val="dk1"/>
                         </a:solidFill>
@@ -5048,38 +5215,46 @@
                     <a:lstStyle/>
                     <a:p>
                       <a:r>
-                        <a:rPr lang="en-AU" sz="1600" dirty="0" smtClean="0"/>
+                        <a:rPr lang="en-AU" sz="1500" dirty="0" smtClean="0"/>
                         <a:t>Travis and the </a:t>
                       </a:r>
                       <a:r>
-                        <a:rPr lang="en-AU" sz="1600" dirty="0" err="1" smtClean="0"/>
+                        <a:rPr lang="en-AU" sz="1500" dirty="0" err="1" smtClean="0"/>
                         <a:t>dev</a:t>
                       </a:r>
                       <a:r>
-                        <a:rPr lang="en-AU" sz="1600" dirty="0" smtClean="0"/>
+                        <a:rPr lang="en-AU" sz="1500" dirty="0" smtClean="0"/>
                         <a:t> team</a:t>
                       </a:r>
                       <a:r>
-                        <a:rPr lang="en-AU" sz="1600" baseline="0" dirty="0" smtClean="0"/>
-                        <a:t> took initiatives to get project back on schedule and has begun meetings with parties.  </a:t>
+                        <a:rPr lang="en-AU" sz="1500" baseline="0" dirty="0" smtClean="0"/>
+                        <a:t> took initiatives to get project back on schedule and has begun meetings with 3rd parties.  </a:t>
                       </a:r>
                       <a:r>
-                        <a:rPr lang="en-AU" sz="1600" baseline="0" dirty="0" err="1" smtClean="0"/>
+                        <a:rPr lang="en-AU" sz="1500" baseline="0" dirty="0" err="1" smtClean="0"/>
                         <a:t>Tegan</a:t>
                       </a:r>
                       <a:r>
-                        <a:rPr lang="en-AU" sz="1600" baseline="0" dirty="0" smtClean="0"/>
+                        <a:rPr lang="en-AU" sz="1500" baseline="0" dirty="0" smtClean="0"/>
                         <a:t> </a:t>
                       </a:r>
                       <a:r>
-                        <a:rPr lang="en-AU" sz="1600" baseline="0" dirty="0" err="1" smtClean="0"/>
+                        <a:rPr lang="en-AU" sz="1500" baseline="0" dirty="0" err="1" smtClean="0"/>
                         <a:t>McNab</a:t>
                       </a:r>
                       <a:r>
-                        <a:rPr lang="en-AU" sz="1600" baseline="0" dirty="0" smtClean="0"/>
-                        <a:t> has undertaken survey’s on current LIMS usage.</a:t>
+                        <a:rPr lang="en-AU" sz="1500" baseline="0" dirty="0" smtClean="0"/>
+                        <a:t> has </a:t>
                       </a:r>
-                      <a:endParaRPr lang="en-AU" sz="1600" dirty="0"/>
+                      <a:r>
+                        <a:rPr lang="en-AU" sz="1500" baseline="0" dirty="0" err="1" smtClean="0"/>
+                        <a:t>devloped</a:t>
+                      </a:r>
+                      <a:r>
+                        <a:rPr lang="en-AU" sz="1500" baseline="0" dirty="0" smtClean="0"/>
+                        <a:t> survey for current WAGER LIMS usage.</a:t>
+                      </a:r>
+                      <a:endParaRPr lang="en-AU" sz="1500" dirty="0"/>
                     </a:p>
                   </a:txBody>
                   <a:tcPr/>
@@ -5109,7 +5284,7 @@
                         <a:defRPr/>
                       </a:pPr>
                       <a:r>
-                        <a:rPr kumimoji="0" lang="en-AU" sz="1800" kern="1200" dirty="0" smtClean="0">
+                        <a:rPr kumimoji="0" lang="en-AU" sz="1500" kern="1200" dirty="0" smtClean="0">
                           <a:solidFill>
                             <a:schemeClr val="dk1"/>
                           </a:solidFill>
@@ -5121,7 +5296,7 @@
                         <a:t>Travis Endersby to </a:t>
                       </a:r>
                       <a:r>
-                        <a:rPr kumimoji="0" lang="en-AU" sz="1800" kern="1200" dirty="0" smtClean="0">
+                        <a:rPr kumimoji="0" lang="en-AU" sz="1500" kern="1200" dirty="0" smtClean="0">
                           <a:solidFill>
                             <a:schemeClr val="dk1"/>
                           </a:solidFill>
@@ -5133,12 +5308,12 @@
                         <a:t>scan and distribute the completed UAT documents to the Steering Committee members as they are signed off.</a:t>
                       </a:r>
                       <a:r>
-                        <a:rPr lang="en-US" sz="1600" dirty="0" smtClean="0">
+                        <a:rPr lang="en-US" sz="1500" dirty="0" smtClean="0">
                           <a:effectLst/>
                         </a:rPr>
                         <a:t> </a:t>
                       </a:r>
-                      <a:endParaRPr lang="en-AU" sz="1600" dirty="0" smtClean="0"/>
+                      <a:endParaRPr lang="en-AU" sz="1500" dirty="0" smtClean="0"/>
                     </a:p>
                   </a:txBody>
                   <a:tcPr/>
@@ -5149,10 +5324,10 @@
                     <a:lstStyle/>
                     <a:p>
                       <a:r>
-                        <a:rPr lang="en-AU" sz="1600" dirty="0" smtClean="0"/>
+                        <a:rPr lang="en-AU" sz="1500" dirty="0" smtClean="0"/>
                         <a:t>Done.</a:t>
                       </a:r>
-                      <a:endParaRPr lang="en-AU" sz="1600" dirty="0"/>
+                      <a:endParaRPr lang="en-AU" sz="1500" dirty="0"/>
                     </a:p>
                   </a:txBody>
                   <a:tcPr/>
@@ -5628,7 +5803,7 @@
       </p:grpSpPr>
       <p:sp>
         <p:nvSpPr>
-          <p:cNvPr id="87" name="Title 86"/>
+          <p:cNvPr id="2" name="Title 1"/>
           <p:cNvSpPr>
             <a:spLocks noGrp="1"/>
           </p:cNvSpPr>
@@ -5638,151 +5813,57 @@
         </p:nvSpPr>
         <p:spPr/>
         <p:txBody>
-          <a:bodyPr>
-            <a:normAutofit/>
-          </a:bodyPr>
+          <a:bodyPr/>
           <a:lstStyle/>
           <a:p>
             <a:r>
               <a:rPr lang="en-US" dirty="0" smtClean="0"/>
-              <a:t>Project Report - Financial</a:t>
+              <a:t>Updated schedule progress</a:t>
             </a:r>
             <a:endParaRPr lang="en-US" dirty="0"/>
           </a:p>
         </p:txBody>
       </p:sp>
-      <p:sp>
-        <p:nvSpPr>
-          <p:cNvPr id="15" name="Content Placeholder 2"/>
-          <p:cNvSpPr>
-            <a:spLocks noGrp="1"/>
-          </p:cNvSpPr>
+      <p:pic>
+        <p:nvPicPr>
+          <p:cNvPr id="6" name="Content Placeholder 5" descr="Screen shot 2013-07-14 at 5.03.53 PM.png"/>
+          <p:cNvPicPr>
+            <a:picLocks noGrp="1" noChangeAspect="1"/>
+          </p:cNvPicPr>
           <p:nvPr>
             <p:ph sz="quarter" idx="1"/>
           </p:nvPr>
-        </p:nvSpPr>
+        </p:nvPicPr>
+        <p:blipFill>
+          <a:blip r:embed="rId2">
+            <a:extLst>
+              <a:ext uri="{28A0092B-C50C-407E-A947-70E740481C1C}">
+                <a14:useLocalDpi xmlns:a14="http://schemas.microsoft.com/office/drawing/2010/main" val="0"/>
+              </a:ext>
+            </a:extLst>
+          </a:blip>
+          <a:srcRect l="-2826" r="-2826"/>
+          <a:stretch>
+            <a:fillRect/>
+          </a:stretch>
+        </p:blipFill>
         <p:spPr>
           <a:xfrm>
-            <a:off x="612648" y="1600200"/>
-            <a:ext cx="8153400" cy="5078498"/>
+            <a:off x="0" y="1499972"/>
+            <a:ext cx="9144000" cy="5358028"/>
           </a:xfrm>
         </p:spPr>
-        <p:txBody>
-          <a:bodyPr>
-            <a:normAutofit lnSpcReduction="10000"/>
-          </a:bodyPr>
-          <a:lstStyle/>
-          <a:p>
-            <a:pPr lvl="0"/>
-            <a:r>
-              <a:rPr lang="en-AU" dirty="0" smtClean="0"/>
-              <a:t>Total </a:t>
-            </a:r>
-            <a:r>
-              <a:rPr lang="en-AU" sz="2800" dirty="0" smtClean="0"/>
-              <a:t>project budget: $614,490</a:t>
-            </a:r>
-          </a:p>
-          <a:p>
-            <a:pPr lvl="0"/>
-            <a:r>
-              <a:rPr lang="en-AU" sz="2800" dirty="0" smtClean="0"/>
-              <a:t>Total </a:t>
-            </a:r>
-            <a:r>
-              <a:rPr lang="en-AU" sz="2800" dirty="0" err="1" smtClean="0"/>
-              <a:t>NeCTAR</a:t>
-            </a:r>
-            <a:r>
-              <a:rPr lang="en-AU" sz="2800" dirty="0" smtClean="0"/>
-              <a:t> contribution: $289,000 (note revised down from initial request)</a:t>
-            </a:r>
-          </a:p>
-          <a:p>
-            <a:pPr lvl="0"/>
-            <a:r>
-              <a:rPr lang="en-AU" sz="2800" dirty="0" smtClean="0"/>
-              <a:t>Total co-investment: $324,965</a:t>
-            </a:r>
-          </a:p>
-          <a:p>
-            <a:pPr lvl="0"/>
-            <a:r>
-              <a:rPr lang="en-AU" sz="2800" dirty="0" smtClean="0"/>
-              <a:t>Funds received to-date $</a:t>
-            </a:r>
-            <a:r>
-              <a:rPr lang="en-AU" sz="2800" dirty="0" smtClean="0"/>
-              <a:t>104,000 </a:t>
-            </a:r>
-            <a:endParaRPr lang="en-AU" sz="2800" dirty="0" smtClean="0"/>
-          </a:p>
-          <a:p>
-            <a:pPr lvl="0"/>
-            <a:r>
-              <a:rPr lang="en-AU" sz="2800" dirty="0" smtClean="0"/>
-              <a:t>See </a:t>
-            </a:r>
-            <a:r>
-              <a:rPr lang="en-AU" sz="2800" dirty="0" smtClean="0"/>
-              <a:t>attached financial </a:t>
-            </a:r>
-            <a:r>
-              <a:rPr lang="en-AU" sz="2800" dirty="0" smtClean="0"/>
-              <a:t>report </a:t>
-            </a:r>
-            <a:endParaRPr lang="en-AU" sz="2800" dirty="0"/>
-          </a:p>
-          <a:p>
-            <a:pPr lvl="0"/>
-            <a:r>
-              <a:rPr lang="en-AU" dirty="0" smtClean="0"/>
-              <a:t>A </a:t>
-            </a:r>
-            <a:r>
-              <a:rPr lang="en-AU" dirty="0"/>
-              <a:t>restructuring of funding milestones was made due to staffing and dependencies, we are awaiting the response, but </a:t>
-            </a:r>
-            <a:r>
-              <a:rPr lang="en-AU" dirty="0" smtClean="0"/>
-              <a:t>were told all </a:t>
-            </a:r>
-            <a:r>
-              <a:rPr lang="en-AU" dirty="0"/>
-              <a:t>seems to be in order</a:t>
-            </a:r>
-            <a:r>
-              <a:rPr lang="en-AU" dirty="0" smtClean="0"/>
-              <a:t>.  For now we are reporting against existing milestones.</a:t>
-            </a:r>
-            <a:endParaRPr lang="en-US" dirty="0"/>
-          </a:p>
-          <a:p>
-            <a:pPr>
-              <a:buNone/>
-            </a:pPr>
-            <a:endParaRPr lang="en-US" dirty="0" smtClean="0"/>
-          </a:p>
-          <a:p>
-            <a:endParaRPr lang="en-US" dirty="0" smtClean="0"/>
-          </a:p>
-          <a:p>
-            <a:endParaRPr lang="en-US" dirty="0" smtClean="0"/>
-          </a:p>
-        </p:txBody>
-      </p:sp>
+      </p:pic>
     </p:spTree>
+    <p:extLst>
+      <p:ext uri="{BB962C8B-B14F-4D97-AF65-F5344CB8AC3E}">
+        <p14:creationId xmlns:p14="http://schemas.microsoft.com/office/powerpoint/2010/main" val="444679081"/>
+      </p:ext>
+    </p:extLst>
   </p:cSld>
   <p:clrMapOvr>
     <a:masterClrMapping/>
   </p:clrMapOvr>
-  <p:timing>
-    <p:tnLst>
-      <p:par>
-        <p:cTn xmlns:p14="http://schemas.microsoft.com/office/powerpoint/2010/main" id="1" dur="indefinite" restart="never" nodeType="tmRoot"/>
-      </p:par>
-    </p:tnLst>
-  </p:timing>
 </p:sld>
 </file>
 
@@ -5805,6 +5886,187 @@
       </p:grpSpPr>
       <p:sp>
         <p:nvSpPr>
+          <p:cNvPr id="87" name="Title 86"/>
+          <p:cNvSpPr>
+            <a:spLocks noGrp="1"/>
+          </p:cNvSpPr>
+          <p:nvPr>
+            <p:ph type="title"/>
+          </p:nvPr>
+        </p:nvSpPr>
+        <p:spPr/>
+        <p:txBody>
+          <a:bodyPr>
+            <a:normAutofit/>
+          </a:bodyPr>
+          <a:lstStyle/>
+          <a:p>
+            <a:r>
+              <a:rPr lang="en-US" dirty="0" smtClean="0"/>
+              <a:t>Project Report - Financial</a:t>
+            </a:r>
+            <a:endParaRPr lang="en-US" dirty="0"/>
+          </a:p>
+        </p:txBody>
+      </p:sp>
+      <p:sp>
+        <p:nvSpPr>
+          <p:cNvPr id="15" name="Content Placeholder 2"/>
+          <p:cNvSpPr>
+            <a:spLocks noGrp="1"/>
+          </p:cNvSpPr>
+          <p:nvPr>
+            <p:ph sz="quarter" idx="1"/>
+          </p:nvPr>
+        </p:nvSpPr>
+        <p:spPr>
+          <a:xfrm>
+            <a:off x="612648" y="1600200"/>
+            <a:ext cx="8153400" cy="5078498"/>
+          </a:xfrm>
+        </p:spPr>
+        <p:txBody>
+          <a:bodyPr>
+            <a:normAutofit fontScale="92500"/>
+          </a:bodyPr>
+          <a:lstStyle/>
+          <a:p>
+            <a:pPr lvl="0"/>
+            <a:r>
+              <a:rPr lang="en-AU" dirty="0" smtClean="0"/>
+              <a:t>Total </a:t>
+            </a:r>
+            <a:r>
+              <a:rPr lang="en-AU" sz="2800" dirty="0" smtClean="0"/>
+              <a:t>project budget: $614,490</a:t>
+            </a:r>
+          </a:p>
+          <a:p>
+            <a:pPr lvl="0"/>
+            <a:r>
+              <a:rPr lang="en-AU" sz="2800" dirty="0" smtClean="0"/>
+              <a:t>Total </a:t>
+            </a:r>
+            <a:r>
+              <a:rPr lang="en-AU" sz="2800" dirty="0" err="1" smtClean="0"/>
+              <a:t>NeCTAR</a:t>
+            </a:r>
+            <a:r>
+              <a:rPr lang="en-AU" sz="2800" dirty="0" smtClean="0"/>
+              <a:t> contribution: $289,000 (note revised down from initial request)</a:t>
+            </a:r>
+          </a:p>
+          <a:p>
+            <a:pPr lvl="0"/>
+            <a:r>
+              <a:rPr lang="en-AU" sz="2800" dirty="0" smtClean="0"/>
+              <a:t>Total co-investment: $324,965</a:t>
+            </a:r>
+          </a:p>
+          <a:p>
+            <a:pPr lvl="0"/>
+            <a:r>
+              <a:rPr lang="en-AU" sz="2800" dirty="0" smtClean="0"/>
+              <a:t>Funds received to-date $</a:t>
+            </a:r>
+            <a:r>
+              <a:rPr lang="en-AU" sz="2800" dirty="0" smtClean="0"/>
+              <a:t>156,000 </a:t>
+            </a:r>
+            <a:endParaRPr lang="en-AU" sz="2800" dirty="0" smtClean="0"/>
+          </a:p>
+          <a:p>
+            <a:pPr lvl="0"/>
+            <a:r>
+              <a:rPr lang="en-AU" sz="2800" dirty="0" smtClean="0"/>
+              <a:t>See </a:t>
+            </a:r>
+            <a:r>
+              <a:rPr lang="en-AU" sz="2800" dirty="0" smtClean="0"/>
+              <a:t>attached financial </a:t>
+            </a:r>
+            <a:r>
+              <a:rPr lang="en-AU" sz="2800" dirty="0" smtClean="0"/>
+              <a:t>report </a:t>
+            </a:r>
+            <a:endParaRPr lang="en-AU" sz="2800" dirty="0"/>
+          </a:p>
+          <a:p>
+            <a:pPr lvl="0"/>
+            <a:r>
+              <a:rPr lang="en-AU" dirty="0" smtClean="0"/>
+              <a:t>A </a:t>
+            </a:r>
+            <a:r>
+              <a:rPr lang="en-AU" dirty="0"/>
+              <a:t>restructuring of funding milestones was made due to staffing and dependencies, we are awaiting the response, but </a:t>
+            </a:r>
+            <a:r>
+              <a:rPr lang="en-AU" dirty="0" smtClean="0"/>
+              <a:t>were told all is in </a:t>
+            </a:r>
+            <a:r>
+              <a:rPr lang="en-AU" dirty="0"/>
+              <a:t>order</a:t>
+            </a:r>
+            <a:r>
+              <a:rPr lang="en-AU" dirty="0" smtClean="0"/>
+              <a:t>.  For now we are reporting against existing </a:t>
+            </a:r>
+            <a:r>
+              <a:rPr lang="en-AU" dirty="0" smtClean="0"/>
+              <a:t>milestones and keeping on track for new milestones to ensure project completed.</a:t>
+            </a:r>
+            <a:endParaRPr lang="en-US" dirty="0"/>
+          </a:p>
+          <a:p>
+            <a:pPr>
+              <a:buNone/>
+            </a:pPr>
+            <a:endParaRPr lang="en-US" dirty="0" smtClean="0"/>
+          </a:p>
+          <a:p>
+            <a:endParaRPr lang="en-US" dirty="0" smtClean="0"/>
+          </a:p>
+          <a:p>
+            <a:endParaRPr lang="en-US" dirty="0" smtClean="0"/>
+          </a:p>
+        </p:txBody>
+      </p:sp>
+    </p:spTree>
+  </p:cSld>
+  <p:clrMapOvr>
+    <a:masterClrMapping/>
+  </p:clrMapOvr>
+  <p:timing>
+    <p:tnLst>
+      <p:par>
+        <p:cTn xmlns:p14="http://schemas.microsoft.com/office/powerpoint/2010/main" id="1" dur="indefinite" restart="never" nodeType="tmRoot"/>
+      </p:par>
+    </p:tnLst>
+  </p:timing>
+</p:sld>
+</file>
+
+<file path=ppt/slides/slide8.xml><?xml version="1.0" encoding="utf-8"?>
+<p:sld xmlns:a="http://schemas.openxmlformats.org/drawingml/2006/main" xmlns:r="http://schemas.openxmlformats.org/officeDocument/2006/relationships" xmlns:p="http://schemas.openxmlformats.org/presentationml/2006/main">
+  <p:cSld>
+    <p:spTree>
+      <p:nvGrpSpPr>
+        <p:cNvPr id="1" name=""/>
+        <p:cNvGrpSpPr/>
+        <p:nvPr/>
+      </p:nvGrpSpPr>
+      <p:grpSpPr>
+        <a:xfrm>
+          <a:off x="0" y="0"/>
+          <a:ext cx="0" cy="0"/>
+          <a:chOff x="0" y="0"/>
+          <a:chExt cx="0" cy="0"/>
+        </a:xfrm>
+      </p:grpSpPr>
+      <p:sp>
+        <p:nvSpPr>
           <p:cNvPr id="2" name="Title 1"/>
           <p:cNvSpPr>
             <a:spLocks noGrp="1"/>
@@ -5832,7 +6094,7 @@
       </p:sp>
       <p:pic>
         <p:nvPicPr>
-          <p:cNvPr id="9" name="Content Placeholder 8" descr="Screen shot 2013-07-12 at 5.27.59 AM.png"/>
+          <p:cNvPr id="11" name="Content Placeholder 10"/>
           <p:cNvPicPr>
             <a:picLocks noGrp="1" noChangeAspect="1"/>
           </p:cNvPicPr>
@@ -5840,7 +6102,7 @@
             <p:ph sz="quarter" idx="1"/>
           </p:nvPr>
         </p:nvPicPr>
-        <p:blipFill rotWithShape="1">
+        <p:blipFill>
           <a:blip r:embed="rId2">
             <a:extLst>
               <a:ext uri="{28A0092B-C50C-407E-A947-70E740481C1C}">
@@ -5848,13 +6110,14 @@
               </a:ext>
             </a:extLst>
           </a:blip>
-          <a:srcRect l="4486" r="8662"/>
-          <a:stretch/>
+          <a:stretch>
+            <a:fillRect/>
+          </a:stretch>
         </p:blipFill>
         <p:spPr>
           <a:xfrm>
-            <a:off x="-1364074" y="1600200"/>
-            <a:ext cx="11551426" cy="4495800"/>
+            <a:off x="0" y="1994953"/>
+            <a:ext cx="9238074" cy="3706293"/>
           </a:xfrm>
         </p:spPr>
       </p:pic>
@@ -5878,7 +6141,7 @@
 </p:sld>
 </file>
 
-<file path=ppt/slides/slide8.xml><?xml version="1.0" encoding="utf-8"?>
+<file path=ppt/slides/slide9.xml><?xml version="1.0" encoding="utf-8"?>
 <p:sld xmlns:a="http://schemas.openxmlformats.org/drawingml/2006/main" xmlns:r="http://schemas.openxmlformats.org/officeDocument/2006/relationships" xmlns:p="http://schemas.openxmlformats.org/presentationml/2006/main">
   <p:cSld>
     <p:spTree>
@@ -7136,164 +7399,6 @@
 </p:sld>
 </file>
 
-<file path=ppt/slides/slide9.xml><?xml version="1.0" encoding="utf-8"?>
-<p:sld xmlns:a="http://schemas.openxmlformats.org/drawingml/2006/main" xmlns:r="http://schemas.openxmlformats.org/officeDocument/2006/relationships" xmlns:p="http://schemas.openxmlformats.org/presentationml/2006/main">
-  <p:cSld>
-    <p:spTree>
-      <p:nvGrpSpPr>
-        <p:cNvPr id="1" name=""/>
-        <p:cNvGrpSpPr/>
-        <p:nvPr/>
-      </p:nvGrpSpPr>
-      <p:grpSpPr>
-        <a:xfrm>
-          <a:off x="0" y="0"/>
-          <a:ext cx="0" cy="0"/>
-          <a:chOff x="0" y="0"/>
-          <a:chExt cx="0" cy="0"/>
-        </a:xfrm>
-      </p:grpSpPr>
-      <p:sp>
-        <p:nvSpPr>
-          <p:cNvPr id="87" name="Title 86"/>
-          <p:cNvSpPr>
-            <a:spLocks noGrp="1"/>
-          </p:cNvSpPr>
-          <p:nvPr>
-            <p:ph type="title"/>
-          </p:nvPr>
-        </p:nvSpPr>
-        <p:spPr/>
-        <p:txBody>
-          <a:bodyPr>
-            <a:normAutofit/>
-          </a:bodyPr>
-          <a:lstStyle/>
-          <a:p>
-            <a:r>
-              <a:rPr lang="en-US" dirty="0" smtClean="0"/>
-              <a:t>Other Business</a:t>
-            </a:r>
-            <a:endParaRPr lang="en-US" dirty="0"/>
-          </a:p>
-        </p:txBody>
-      </p:sp>
-      <p:sp>
-        <p:nvSpPr>
-          <p:cNvPr id="4" name="Content Placeholder 2"/>
-          <p:cNvSpPr>
-            <a:spLocks noGrp="1"/>
-          </p:cNvSpPr>
-          <p:nvPr>
-            <p:ph sz="quarter" idx="1"/>
-          </p:nvPr>
-        </p:nvSpPr>
-        <p:spPr>
-          <a:xfrm>
-            <a:off x="386512" y="1600200"/>
-            <a:ext cx="8613696" cy="5078498"/>
-          </a:xfrm>
-        </p:spPr>
-        <p:txBody>
-          <a:bodyPr>
-            <a:normAutofit fontScale="77500" lnSpcReduction="20000"/>
-          </a:bodyPr>
-          <a:lstStyle/>
-          <a:p>
-            <a:pPr lvl="0"/>
-            <a:r>
-              <a:rPr lang="en-AU" dirty="0" err="1" smtClean="0"/>
-              <a:t>SPArk</a:t>
-            </a:r>
-            <a:r>
-              <a:rPr lang="en-AU" dirty="0" smtClean="0"/>
-              <a:t> Grant under way to facilitate super computer analysis routines from within the ARK</a:t>
-            </a:r>
-            <a:r>
-              <a:rPr lang="en-AU" dirty="0" smtClean="0"/>
-              <a:t>.  Returned responses.</a:t>
-            </a:r>
-          </a:p>
-          <a:p>
-            <a:pPr lvl="0"/>
-            <a:r>
-              <a:rPr lang="en-AU" dirty="0" smtClean="0"/>
-              <a:t>Migrated 21 Studies from WARTN.  One month of successful production use and positive responses </a:t>
-            </a:r>
-          </a:p>
-          <a:p>
-            <a:pPr lvl="1"/>
-            <a:r>
-              <a:rPr lang="en-AU" dirty="0" smtClean="0"/>
-              <a:t>Despite great response, there is still work/requests in place as a result of increased use and testing.</a:t>
-            </a:r>
-            <a:endParaRPr lang="en-AU" dirty="0" smtClean="0"/>
-          </a:p>
-          <a:p>
-            <a:pPr lvl="0"/>
-            <a:r>
-              <a:rPr lang="en-AU" dirty="0" smtClean="0"/>
-              <a:t>Date for next meeting – </a:t>
-            </a:r>
-            <a:r>
-              <a:rPr lang="en-AU" dirty="0" smtClean="0"/>
-              <a:t>mid September, 2013 to pre-empt report, or after report Mid October?</a:t>
-            </a:r>
-          </a:p>
-          <a:p>
-            <a:pPr lvl="0"/>
-            <a:r>
-              <a:rPr lang="en-AU" dirty="0" smtClean="0"/>
-              <a:t>Travis and Adrian have been in talks and providing presentations with potential new users.  Advice on how to reach out to others welcome.</a:t>
-            </a:r>
-          </a:p>
-          <a:p>
-            <a:pPr lvl="0"/>
-            <a:r>
-              <a:rPr lang="en-AU" dirty="0" smtClean="0"/>
-              <a:t>We welcome suggestions on how this project can fund salaries to continue to expand and be used.</a:t>
-            </a:r>
-            <a:endParaRPr lang="en-AU" dirty="0" smtClean="0"/>
-          </a:p>
-          <a:p>
-            <a:r>
-              <a:rPr lang="en-US" dirty="0" smtClean="0"/>
-              <a:t>Update on proposed operational </a:t>
-            </a:r>
-            <a:r>
-              <a:rPr lang="en-US" dirty="0" smtClean="0"/>
-              <a:t>improvements </a:t>
-            </a:r>
-            <a:r>
-              <a:rPr lang="en-US" dirty="0" smtClean="0"/>
-              <a:t>from last meeting</a:t>
-            </a:r>
-            <a:r>
-              <a:rPr lang="en-US" dirty="0" smtClean="0"/>
-              <a:t>;</a:t>
-            </a:r>
-            <a:endParaRPr lang="en-US" dirty="0" smtClean="0"/>
-          </a:p>
-          <a:p>
-            <a:endParaRPr lang="en-US" dirty="0" smtClean="0"/>
-          </a:p>
-        </p:txBody>
-      </p:sp>
-    </p:spTree>
-  </p:cSld>
-  <p:clrMapOvr>
-    <a:masterClrMapping/>
-  </p:clrMapOvr>
-  <p:timing>
-    <p:tnLst>
-      <p:par>
-        <p:cTn xmlns:p14="http://schemas.microsoft.com/office/powerpoint/2010/main" id="1" dur="indefinite" restart="never" nodeType="tmRoot"/>
-      </p:par>
-    </p:tnLst>
-  </p:timing>
-</p:sld>
-</file>
-
 <file path=ppt/theme/theme1.xml><?xml version="1.0" encoding="utf-8"?>
 <a:theme xmlns:a="http://schemas.openxmlformats.org/drawingml/2006/main" name="Median">
   <a:themeElements>

</xml_diff>